<commit_message>
Bổ sung project + buổi 6 môn IDA
</commit_message>
<xml_diff>
--- a/HomeWork/Ky 2/DAM501.8/Test & Project/Project/Project/Slide.pptx
+++ b/HomeWork/Ky 2/DAM501.8/Test & Project/Project/Project/Slide.pptx
@@ -1,22 +1,23 @@
 
 <file path=ppt/presentation.xml><?xml version="1.0" encoding="utf-8"?>
-<p:presentation xmlns:a="http://schemas.openxmlformats.org/drawingml/2006/main" xmlns:r="http://schemas.openxmlformats.org/officeDocument/2006/relationships" xmlns:p="http://schemas.openxmlformats.org/presentationml/2006/main" autoCompressPictures="0">
+<p:presentation xmlns:a="http://schemas.openxmlformats.org/drawingml/2006/main" xmlns:r="http://schemas.openxmlformats.org/officeDocument/2006/relationships" xmlns:p="http://schemas.openxmlformats.org/presentationml/2006/main" saveSubsetFonts="1" autoCompressPictures="0">
   <p:sldMasterIdLst>
     <p:sldMasterId id="2147483648" r:id="rId1"/>
   </p:sldMasterIdLst>
   <p:sldIdLst>
-    <p:sldId id="256" r:id="rId3"/>
-    <p:sldId id="257" r:id="rId4"/>
-    <p:sldId id="258" r:id="rId5"/>
-    <p:sldId id="259" r:id="rId6"/>
-    <p:sldId id="260" r:id="rId7"/>
-    <p:sldId id="261" r:id="rId8"/>
-    <p:sldId id="262" r:id="rId9"/>
-    <p:sldId id="263" r:id="rId10"/>
-    <p:sldId id="264" r:id="rId11"/>
-    <p:sldId id="265" r:id="rId12"/>
-    <p:sldId id="266" r:id="rId13"/>
-    <p:sldId id="267" r:id="rId14"/>
+    <p:sldId id="256" r:id="rId7"/>
+    <p:sldId id="257" r:id="rId8"/>
+    <p:sldId id="258" r:id="rId9"/>
+    <p:sldId id="259" r:id="rId10"/>
+    <p:sldId id="260" r:id="rId11"/>
+    <p:sldId id="261" r:id="rId12"/>
+    <p:sldId id="262" r:id="rId13"/>
+    <p:sldId id="263" r:id="rId14"/>
+    <p:sldId id="264" r:id="rId15"/>
+    <p:sldId id="265" r:id="rId16"/>
+    <p:sldId id="266" r:id="rId17"/>
+    <p:sldId id="267" r:id="rId18"/>
+    <p:sldId id="268" r:id="rId19"/>
   </p:sldIdLst>
   <p:sldSz cx="9144000" cy="6858000" type="screen4x3"/>
   <p:notesSz cx="6858000" cy="9144000"/>
@@ -115,23 +116,129 @@
       </a:defRPr>
     </a:lvl9pPr>
   </p:defaultTextStyle>
-  <p:extLst>
-    <p:ext uri="{EFAFB233-063F-42B5-8137-9DF3F51BA10A}">
-      <p15:sldGuideLst xmlns:p15="http://schemas.microsoft.com/office/powerpoint/2012/main">
-        <p15:guide id="1" orient="horz" pos="2160" userDrawn="1">
-          <p15:clr>
-            <a:srgbClr val="A4A3A4"/>
-          </p15:clr>
-        </p15:guide>
-        <p15:guide id="2" pos="2880" userDrawn="1">
-          <p15:clr>
-            <a:srgbClr val="A4A3A4"/>
-          </p15:clr>
-        </p15:guide>
-      </p15:sldGuideLst>
-    </p:ext>
-  </p:extLst>
 </p:presentation>
+</file>
+
+<file path=ppt/charts/chart1.xml><?xml version="1.0" encoding="utf-8"?>
+<c:chartSpace xmlns:c="http://schemas.openxmlformats.org/drawingml/2006/chart" xmlns:a="http://schemas.openxmlformats.org/drawingml/2006/main" xmlns:r="http://schemas.openxmlformats.org/officeDocument/2006/relationships">
+  <c:date1904 val="0"/>
+  <c:chart>
+    <c:autoTitleDeleted val="0"/>
+    <c:plotArea>
+      <c:barChart>
+        <c:barDir val="col"/>
+        <c:grouping val="clustered"/>
+        <c:ser>
+          <c:idx val="0"/>
+          <c:order val="0"/>
+          <c:tx>
+            <c:strRef>
+              <c:f>Sheet1!$B$1</c:f>
+              <c:strCache>
+                <c:ptCount val="1"/>
+                <c:pt idx="0">
+                  <c:v>Số dòng</c:v>
+                </c:pt>
+              </c:strCache>
+            </c:strRef>
+          </c:tx>
+          <c:cat>
+            <c:strRef>
+              <c:f>Sheet1!$A$2:$A$6</c:f>
+              <c:strCache>
+                <c:ptCount val="5"/>
+                <c:pt idx="0">
+                  <c:v>Electronics</c:v>
+                </c:pt>
+                <c:pt idx="1">
+                  <c:v>Grocery</c:v>
+                </c:pt>
+                <c:pt idx="2">
+                  <c:v>Clothing</c:v>
+                </c:pt>
+                <c:pt idx="3">
+                  <c:v>Books</c:v>
+                </c:pt>
+                <c:pt idx="4">
+                  <c:v>Home Decor</c:v>
+                </c:pt>
+              </c:strCache>
+            </c:strRef>
+          </c:cat>
+          <c:val>
+            <c:numRef>
+              <c:f>Sheet1!$B$2:$B$6</c:f>
+              <c:numCache>
+                <c:formatCode>General</c:formatCode>
+                <c:ptCount val="5"/>
+                <c:pt idx="0">
+                  <c:v>71196</c:v>
+                </c:pt>
+                <c:pt idx="1">
+                  <c:v>66786</c:v>
+                </c:pt>
+                <c:pt idx="2">
+                  <c:v>54741</c:v>
+                </c:pt>
+                <c:pt idx="3">
+                  <c:v>54622</c:v>
+                </c:pt>
+                <c:pt idx="4">
+                  <c:v>54382</c:v>
+                </c:pt>
+              </c:numCache>
+            </c:numRef>
+          </c:val>
+        </c:ser>
+        <c:axId val="-2068027336"/>
+        <c:axId val="-2113994440"/>
+      </c:barChart>
+      <c:catAx>
+        <c:axId val="-2068027336"/>
+        <c:scaling>
+          <c:orientation val="minMax"/>
+        </c:scaling>
+        <c:delete val="0"/>
+        <c:axPos val="b"/>
+        <c:majorTickMark val="out"/>
+        <c:minorTickMark val="none"/>
+        <c:tickLblPos val="nextTo"/>
+        <c:crossAx val="-2113994440"/>
+        <c:crosses val="autoZero"/>
+        <c:auto val="1"/>
+        <c:lblAlgn val="ctr"/>
+        <c:lblOffset val="100"/>
+        <c:noMultiLvlLbl val="0"/>
+      </c:catAx>
+      <c:valAx>
+        <c:axId val="-2113994440"/>
+        <c:scaling/>
+        <c:delete val="0"/>
+        <c:axPos val="l"/>
+        <c:majorGridlines/>
+        <c:majorTickMark val="out"/>
+        <c:minorTickMark val="none"/>
+        <c:tickLblPos val="nextTo"/>
+        <c:crossAx val="-2068027336"/>
+        <c:crosses val="autoZero"/>
+      </c:valAx>
+    </c:plotArea>
+    <c:dispBlanksAs val="gap"/>
+  </c:chart>
+  <c:txPr>
+    <a:bodyPr/>
+    <a:lstStyle/>
+    <a:p>
+      <a:pPr>
+        <a:defRPr sz="1800"/>
+      </a:pPr>
+      <a:endParaRPr lang="en-US"/>
+    </a:p>
+  </c:txPr>
+  <c:externalData r:id="rId1">
+    <c:autoUpdate val="0"/>
+  </c:externalData>
+</c:chartSpace>
 </file>
 
 <file path=ppt/slideLayouts/slideLayout1.xml><?xml version="1.0" encoding="utf-8"?>
@@ -315,6 +422,7 @@
           <a:p>
             <a:fld id="{5BCAD085-E8A6-8845-BD4E-CB4CCA059FC4}" type="datetimeFigureOut">
               <a:rPr lang="en-US" smtClean="0"/>
+              <a:t>1/27/13</a:t>
             </a:fld>
             <a:endParaRPr lang="en-US"/>
           </a:p>
@@ -356,12 +464,18 @@
           <a:p>
             <a:fld id="{C1FF6DA9-008F-8B48-92A6-B652298478BF}" type="slidenum">
               <a:rPr lang="en-US" smtClean="0"/>
+              <a:t>‹#›</a:t>
             </a:fld>
             <a:endParaRPr lang="en-US"/>
           </a:p>
         </p:txBody>
       </p:sp>
     </p:spTree>
+    <p:extLst>
+      <p:ext uri="{BB962C8B-B14F-4D97-AF65-F5344CB8AC3E}">
+        <p14:creationId xmlns:p14="http://schemas.microsoft.com/office/powerpoint/2010/main" val="3168075583"/>
+      </p:ext>
+    </p:extLst>
   </p:cSld>
   <p:clrMapOvr>
     <a:masterClrMapping/>
@@ -429,7 +543,6 @@
               <a:rPr lang="en-US" smtClean="0"/>
               <a:t>Click to edit Master text styles</a:t>
             </a:r>
-            <a:endParaRPr lang="en-US" smtClean="0"/>
           </a:p>
           <a:p>
             <a:pPr lvl="1"/>
@@ -437,7 +550,6 @@
               <a:rPr lang="en-US" smtClean="0"/>
               <a:t>Second level</a:t>
             </a:r>
-            <a:endParaRPr lang="en-US" smtClean="0"/>
           </a:p>
           <a:p>
             <a:pPr lvl="2"/>
@@ -445,7 +557,6 @@
               <a:rPr lang="en-US" smtClean="0"/>
               <a:t>Third level</a:t>
             </a:r>
-            <a:endParaRPr lang="en-US" smtClean="0"/>
           </a:p>
           <a:p>
             <a:pPr lvl="3"/>
@@ -453,7 +564,6 @@
               <a:rPr lang="en-US" smtClean="0"/>
               <a:t>Fourth level</a:t>
             </a:r>
-            <a:endParaRPr lang="en-US" smtClean="0"/>
           </a:p>
           <a:p>
             <a:pPr lvl="4"/>
@@ -482,6 +592,7 @@
           <a:p>
             <a:fld id="{5BCAD085-E8A6-8845-BD4E-CB4CCA059FC4}" type="datetimeFigureOut">
               <a:rPr lang="en-US" smtClean="0"/>
+              <a:t>1/27/13</a:t>
             </a:fld>
             <a:endParaRPr lang="en-US"/>
           </a:p>
@@ -523,12 +634,18 @@
           <a:p>
             <a:fld id="{C1FF6DA9-008F-8B48-92A6-B652298478BF}" type="slidenum">
               <a:rPr lang="en-US" smtClean="0"/>
+              <a:t>‹#›</a:t>
             </a:fld>
             <a:endParaRPr lang="en-US"/>
           </a:p>
         </p:txBody>
       </p:sp>
     </p:spTree>
+    <p:extLst>
+      <p:ext uri="{BB962C8B-B14F-4D97-AF65-F5344CB8AC3E}">
+        <p14:creationId xmlns:p14="http://schemas.microsoft.com/office/powerpoint/2010/main" val="2910927964"/>
+      </p:ext>
+    </p:extLst>
   </p:cSld>
   <p:clrMapOvr>
     <a:masterClrMapping/>
@@ -606,7 +723,6 @@
               <a:rPr lang="en-US" smtClean="0"/>
               <a:t>Click to edit Master text styles</a:t>
             </a:r>
-            <a:endParaRPr lang="en-US" smtClean="0"/>
           </a:p>
           <a:p>
             <a:pPr lvl="1"/>
@@ -614,7 +730,6 @@
               <a:rPr lang="en-US" smtClean="0"/>
               <a:t>Second level</a:t>
             </a:r>
-            <a:endParaRPr lang="en-US" smtClean="0"/>
           </a:p>
           <a:p>
             <a:pPr lvl="2"/>
@@ -622,7 +737,6 @@
               <a:rPr lang="en-US" smtClean="0"/>
               <a:t>Third level</a:t>
             </a:r>
-            <a:endParaRPr lang="en-US" smtClean="0"/>
           </a:p>
           <a:p>
             <a:pPr lvl="3"/>
@@ -630,7 +744,6 @@
               <a:rPr lang="en-US" smtClean="0"/>
               <a:t>Fourth level</a:t>
             </a:r>
-            <a:endParaRPr lang="en-US" smtClean="0"/>
           </a:p>
           <a:p>
             <a:pPr lvl="4"/>
@@ -659,6 +772,7 @@
           <a:p>
             <a:fld id="{5BCAD085-E8A6-8845-BD4E-CB4CCA059FC4}" type="datetimeFigureOut">
               <a:rPr lang="en-US" smtClean="0"/>
+              <a:t>1/27/13</a:t>
             </a:fld>
             <a:endParaRPr lang="en-US"/>
           </a:p>
@@ -700,12 +814,18 @@
           <a:p>
             <a:fld id="{C1FF6DA9-008F-8B48-92A6-B652298478BF}" type="slidenum">
               <a:rPr lang="en-US" smtClean="0"/>
+              <a:t>‹#›</a:t>
             </a:fld>
             <a:endParaRPr lang="en-US"/>
           </a:p>
         </p:txBody>
       </p:sp>
     </p:spTree>
+    <p:extLst>
+      <p:ext uri="{BB962C8B-B14F-4D97-AF65-F5344CB8AC3E}">
+        <p14:creationId xmlns:p14="http://schemas.microsoft.com/office/powerpoint/2010/main" val="3612223792"/>
+      </p:ext>
+    </p:extLst>
   </p:cSld>
   <p:clrMapOvr>
     <a:masterClrMapping/>
@@ -773,7 +893,6 @@
               <a:rPr lang="en-US" smtClean="0"/>
               <a:t>Click to edit Master text styles</a:t>
             </a:r>
-            <a:endParaRPr lang="en-US" smtClean="0"/>
           </a:p>
           <a:p>
             <a:pPr lvl="1"/>
@@ -781,7 +900,6 @@
               <a:rPr lang="en-US" smtClean="0"/>
               <a:t>Second level</a:t>
             </a:r>
-            <a:endParaRPr lang="en-US" smtClean="0"/>
           </a:p>
           <a:p>
             <a:pPr lvl="2"/>
@@ -789,7 +907,6 @@
               <a:rPr lang="en-US" smtClean="0"/>
               <a:t>Third level</a:t>
             </a:r>
-            <a:endParaRPr lang="en-US" smtClean="0"/>
           </a:p>
           <a:p>
             <a:pPr lvl="3"/>
@@ -797,7 +914,6 @@
               <a:rPr lang="en-US" smtClean="0"/>
               <a:t>Fourth level</a:t>
             </a:r>
-            <a:endParaRPr lang="en-US" smtClean="0"/>
           </a:p>
           <a:p>
             <a:pPr lvl="4"/>
@@ -826,6 +942,7 @@
           <a:p>
             <a:fld id="{5BCAD085-E8A6-8845-BD4E-CB4CCA059FC4}" type="datetimeFigureOut">
               <a:rPr lang="en-US" smtClean="0"/>
+              <a:t>1/27/13</a:t>
             </a:fld>
             <a:endParaRPr lang="en-US"/>
           </a:p>
@@ -867,12 +984,18 @@
           <a:p>
             <a:fld id="{C1FF6DA9-008F-8B48-92A6-B652298478BF}" type="slidenum">
               <a:rPr lang="en-US" smtClean="0"/>
+              <a:t>‹#›</a:t>
             </a:fld>
             <a:endParaRPr lang="en-US"/>
           </a:p>
         </p:txBody>
       </p:sp>
     </p:spTree>
+    <p:extLst>
+      <p:ext uri="{BB962C8B-B14F-4D97-AF65-F5344CB8AC3E}">
+        <p14:creationId xmlns:p14="http://schemas.microsoft.com/office/powerpoint/2010/main" val="2614314258"/>
+      </p:ext>
+    </p:extLst>
   </p:cSld>
   <p:clrMapOvr>
     <a:masterClrMapping/>
@@ -1045,7 +1168,6 @@
               <a:rPr lang="en-US" smtClean="0"/>
               <a:t>Click to edit Master text styles</a:t>
             </a:r>
-            <a:endParaRPr lang="en-US" smtClean="0"/>
           </a:p>
         </p:txBody>
       </p:sp>
@@ -1066,6 +1188,7 @@
           <a:p>
             <a:fld id="{5BCAD085-E8A6-8845-BD4E-CB4CCA059FC4}" type="datetimeFigureOut">
               <a:rPr lang="en-US" smtClean="0"/>
+              <a:t>1/27/13</a:t>
             </a:fld>
             <a:endParaRPr lang="en-US"/>
           </a:p>
@@ -1107,12 +1230,18 @@
           <a:p>
             <a:fld id="{C1FF6DA9-008F-8B48-92A6-B652298478BF}" type="slidenum">
               <a:rPr lang="en-US" smtClean="0"/>
+              <a:t>‹#›</a:t>
             </a:fld>
             <a:endParaRPr lang="en-US"/>
           </a:p>
         </p:txBody>
       </p:sp>
     </p:spTree>
+    <p:extLst>
+      <p:ext uri="{BB962C8B-B14F-4D97-AF65-F5344CB8AC3E}">
+        <p14:creationId xmlns:p14="http://schemas.microsoft.com/office/powerpoint/2010/main" val="960648375"/>
+      </p:ext>
+    </p:extLst>
   </p:cSld>
   <p:clrMapOvr>
     <a:masterClrMapping/>
@@ -1213,7 +1342,6 @@
               <a:rPr lang="en-US" smtClean="0"/>
               <a:t>Click to edit Master text styles</a:t>
             </a:r>
-            <a:endParaRPr lang="en-US" smtClean="0"/>
           </a:p>
           <a:p>
             <a:pPr lvl="1"/>
@@ -1221,7 +1349,6 @@
               <a:rPr lang="en-US" smtClean="0"/>
               <a:t>Second level</a:t>
             </a:r>
-            <a:endParaRPr lang="en-US" smtClean="0"/>
           </a:p>
           <a:p>
             <a:pPr lvl="2"/>
@@ -1229,7 +1356,6 @@
               <a:rPr lang="en-US" smtClean="0"/>
               <a:t>Third level</a:t>
             </a:r>
-            <a:endParaRPr lang="en-US" smtClean="0"/>
           </a:p>
           <a:p>
             <a:pPr lvl="3"/>
@@ -1237,7 +1363,6 @@
               <a:rPr lang="en-US" smtClean="0"/>
               <a:t>Fourth level</a:t>
             </a:r>
-            <a:endParaRPr lang="en-US" smtClean="0"/>
           </a:p>
           <a:p>
             <a:pPr lvl="4"/>
@@ -1302,7 +1427,6 @@
               <a:rPr lang="en-US" smtClean="0"/>
               <a:t>Click to edit Master text styles</a:t>
             </a:r>
-            <a:endParaRPr lang="en-US" smtClean="0"/>
           </a:p>
           <a:p>
             <a:pPr lvl="1"/>
@@ -1310,7 +1434,6 @@
               <a:rPr lang="en-US" smtClean="0"/>
               <a:t>Second level</a:t>
             </a:r>
-            <a:endParaRPr lang="en-US" smtClean="0"/>
           </a:p>
           <a:p>
             <a:pPr lvl="2"/>
@@ -1318,7 +1441,6 @@
               <a:rPr lang="en-US" smtClean="0"/>
               <a:t>Third level</a:t>
             </a:r>
-            <a:endParaRPr lang="en-US" smtClean="0"/>
           </a:p>
           <a:p>
             <a:pPr lvl="3"/>
@@ -1326,7 +1448,6 @@
               <a:rPr lang="en-US" smtClean="0"/>
               <a:t>Fourth level</a:t>
             </a:r>
-            <a:endParaRPr lang="en-US" smtClean="0"/>
           </a:p>
           <a:p>
             <a:pPr lvl="4"/>
@@ -1355,6 +1476,7 @@
           <a:p>
             <a:fld id="{5BCAD085-E8A6-8845-BD4E-CB4CCA059FC4}" type="datetimeFigureOut">
               <a:rPr lang="en-US" smtClean="0"/>
+              <a:t>1/27/13</a:t>
             </a:fld>
             <a:endParaRPr lang="en-US"/>
           </a:p>
@@ -1396,12 +1518,18 @@
           <a:p>
             <a:fld id="{C1FF6DA9-008F-8B48-92A6-B652298478BF}" type="slidenum">
               <a:rPr lang="en-US" smtClean="0"/>
+              <a:t>‹#›</a:t>
             </a:fld>
             <a:endParaRPr lang="en-US"/>
           </a:p>
         </p:txBody>
       </p:sp>
     </p:spTree>
+    <p:extLst>
+      <p:ext uri="{BB962C8B-B14F-4D97-AF65-F5344CB8AC3E}">
+        <p14:creationId xmlns:p14="http://schemas.microsoft.com/office/powerpoint/2010/main" val="2782244947"/>
+      </p:ext>
+    </p:extLst>
   </p:cSld>
   <p:clrMapOvr>
     <a:masterClrMapping/>
@@ -1515,7 +1643,6 @@
               <a:rPr lang="en-US" smtClean="0"/>
               <a:t>Click to edit Master text styles</a:t>
             </a:r>
-            <a:endParaRPr lang="en-US" smtClean="0"/>
           </a:p>
         </p:txBody>
       </p:sp>
@@ -1572,7 +1699,6 @@
               <a:rPr lang="en-US" smtClean="0"/>
               <a:t>Click to edit Master text styles</a:t>
             </a:r>
-            <a:endParaRPr lang="en-US" smtClean="0"/>
           </a:p>
           <a:p>
             <a:pPr lvl="1"/>
@@ -1580,7 +1706,6 @@
               <a:rPr lang="en-US" smtClean="0"/>
               <a:t>Second level</a:t>
             </a:r>
-            <a:endParaRPr lang="en-US" smtClean="0"/>
           </a:p>
           <a:p>
             <a:pPr lvl="2"/>
@@ -1588,7 +1713,6 @@
               <a:rPr lang="en-US" smtClean="0"/>
               <a:t>Third level</a:t>
             </a:r>
-            <a:endParaRPr lang="en-US" smtClean="0"/>
           </a:p>
           <a:p>
             <a:pPr lvl="3"/>
@@ -1596,7 +1720,6 @@
               <a:rPr lang="en-US" smtClean="0"/>
               <a:t>Fourth level</a:t>
             </a:r>
-            <a:endParaRPr lang="en-US" smtClean="0"/>
           </a:p>
           <a:p>
             <a:pPr lvl="4"/>
@@ -1670,7 +1793,6 @@
               <a:rPr lang="en-US" smtClean="0"/>
               <a:t>Click to edit Master text styles</a:t>
             </a:r>
-            <a:endParaRPr lang="en-US" smtClean="0"/>
           </a:p>
         </p:txBody>
       </p:sp>
@@ -1727,7 +1849,6 @@
               <a:rPr lang="en-US" smtClean="0"/>
               <a:t>Click to edit Master text styles</a:t>
             </a:r>
-            <a:endParaRPr lang="en-US" smtClean="0"/>
           </a:p>
           <a:p>
             <a:pPr lvl="1"/>
@@ -1735,7 +1856,6 @@
               <a:rPr lang="en-US" smtClean="0"/>
               <a:t>Second level</a:t>
             </a:r>
-            <a:endParaRPr lang="en-US" smtClean="0"/>
           </a:p>
           <a:p>
             <a:pPr lvl="2"/>
@@ -1743,7 +1863,6 @@
               <a:rPr lang="en-US" smtClean="0"/>
               <a:t>Third level</a:t>
             </a:r>
-            <a:endParaRPr lang="en-US" smtClean="0"/>
           </a:p>
           <a:p>
             <a:pPr lvl="3"/>
@@ -1751,7 +1870,6 @@
               <a:rPr lang="en-US" smtClean="0"/>
               <a:t>Fourth level</a:t>
             </a:r>
-            <a:endParaRPr lang="en-US" smtClean="0"/>
           </a:p>
           <a:p>
             <a:pPr lvl="4"/>
@@ -1780,6 +1898,7 @@
           <a:p>
             <a:fld id="{5BCAD085-E8A6-8845-BD4E-CB4CCA059FC4}" type="datetimeFigureOut">
               <a:rPr lang="en-US" smtClean="0"/>
+              <a:t>1/27/13</a:t>
             </a:fld>
             <a:endParaRPr lang="en-US"/>
           </a:p>
@@ -1821,12 +1940,18 @@
           <a:p>
             <a:fld id="{C1FF6DA9-008F-8B48-92A6-B652298478BF}" type="slidenum">
               <a:rPr lang="en-US" smtClean="0"/>
+              <a:t>‹#›</a:t>
             </a:fld>
             <a:endParaRPr lang="en-US"/>
           </a:p>
         </p:txBody>
       </p:sp>
     </p:spTree>
+    <p:extLst>
+      <p:ext uri="{BB962C8B-B14F-4D97-AF65-F5344CB8AC3E}">
+        <p14:creationId xmlns:p14="http://schemas.microsoft.com/office/powerpoint/2010/main" val="990158736"/>
+      </p:ext>
+    </p:extLst>
   </p:cSld>
   <p:clrMapOvr>
     <a:masterClrMapping/>
@@ -1891,6 +2016,7 @@
           <a:p>
             <a:fld id="{5BCAD085-E8A6-8845-BD4E-CB4CCA059FC4}" type="datetimeFigureOut">
               <a:rPr lang="en-US" smtClean="0"/>
+              <a:t>1/27/13</a:t>
             </a:fld>
             <a:endParaRPr lang="en-US"/>
           </a:p>
@@ -1932,12 +2058,18 @@
           <a:p>
             <a:fld id="{C1FF6DA9-008F-8B48-92A6-B652298478BF}" type="slidenum">
               <a:rPr lang="en-US" smtClean="0"/>
+              <a:t>‹#›</a:t>
             </a:fld>
             <a:endParaRPr lang="en-US"/>
           </a:p>
         </p:txBody>
       </p:sp>
     </p:spTree>
+    <p:extLst>
+      <p:ext uri="{BB962C8B-B14F-4D97-AF65-F5344CB8AC3E}">
+        <p14:creationId xmlns:p14="http://schemas.microsoft.com/office/powerpoint/2010/main" val="727027711"/>
+      </p:ext>
+    </p:extLst>
   </p:cSld>
   <p:clrMapOvr>
     <a:masterClrMapping/>
@@ -1979,6 +2111,7 @@
           <a:p>
             <a:fld id="{5BCAD085-E8A6-8845-BD4E-CB4CCA059FC4}" type="datetimeFigureOut">
               <a:rPr lang="en-US" smtClean="0"/>
+              <a:t>1/27/13</a:t>
             </a:fld>
             <a:endParaRPr lang="en-US"/>
           </a:p>
@@ -2020,12 +2153,18 @@
           <a:p>
             <a:fld id="{C1FF6DA9-008F-8B48-92A6-B652298478BF}" type="slidenum">
               <a:rPr lang="en-US" smtClean="0"/>
+              <a:t>‹#›</a:t>
             </a:fld>
             <a:endParaRPr lang="en-US"/>
           </a:p>
         </p:txBody>
       </p:sp>
     </p:spTree>
+    <p:extLst>
+      <p:ext uri="{BB962C8B-B14F-4D97-AF65-F5344CB8AC3E}">
+        <p14:creationId xmlns:p14="http://schemas.microsoft.com/office/powerpoint/2010/main" val="1212999818"/>
+      </p:ext>
+    </p:extLst>
   </p:cSld>
   <p:clrMapOvr>
     <a:masterClrMapping/>
@@ -2135,7 +2274,6 @@
               <a:rPr lang="en-US" smtClean="0"/>
               <a:t>Click to edit Master text styles</a:t>
             </a:r>
-            <a:endParaRPr lang="en-US" smtClean="0"/>
           </a:p>
           <a:p>
             <a:pPr lvl="1"/>
@@ -2143,7 +2281,6 @@
               <a:rPr lang="en-US" smtClean="0"/>
               <a:t>Second level</a:t>
             </a:r>
-            <a:endParaRPr lang="en-US" smtClean="0"/>
           </a:p>
           <a:p>
             <a:pPr lvl="2"/>
@@ -2151,7 +2288,6 @@
               <a:rPr lang="en-US" smtClean="0"/>
               <a:t>Third level</a:t>
             </a:r>
-            <a:endParaRPr lang="en-US" smtClean="0"/>
           </a:p>
           <a:p>
             <a:pPr lvl="3"/>
@@ -2159,7 +2295,6 @@
               <a:rPr lang="en-US" smtClean="0"/>
               <a:t>Fourth level</a:t>
             </a:r>
-            <a:endParaRPr lang="en-US" smtClean="0"/>
           </a:p>
           <a:p>
             <a:pPr lvl="4"/>
@@ -2233,7 +2368,6 @@
               <a:rPr lang="en-US" smtClean="0"/>
               <a:t>Click to edit Master text styles</a:t>
             </a:r>
-            <a:endParaRPr lang="en-US" smtClean="0"/>
           </a:p>
         </p:txBody>
       </p:sp>
@@ -2254,6 +2388,7 @@
           <a:p>
             <a:fld id="{5BCAD085-E8A6-8845-BD4E-CB4CCA059FC4}" type="datetimeFigureOut">
               <a:rPr lang="en-US" smtClean="0"/>
+              <a:t>1/27/13</a:t>
             </a:fld>
             <a:endParaRPr lang="en-US"/>
           </a:p>
@@ -2295,12 +2430,18 @@
           <a:p>
             <a:fld id="{C1FF6DA9-008F-8B48-92A6-B652298478BF}" type="slidenum">
               <a:rPr lang="en-US" smtClean="0"/>
+              <a:t>‹#›</a:t>
             </a:fld>
             <a:endParaRPr lang="en-US"/>
           </a:p>
         </p:txBody>
       </p:sp>
     </p:spTree>
+    <p:extLst>
+      <p:ext uri="{BB962C8B-B14F-4D97-AF65-F5344CB8AC3E}">
+        <p14:creationId xmlns:p14="http://schemas.microsoft.com/office/powerpoint/2010/main" val="1840726560"/>
+      </p:ext>
+    </p:extLst>
   </p:cSld>
   <p:clrMapOvr>
     <a:masterClrMapping/>
@@ -2480,7 +2621,6 @@
               <a:rPr lang="en-US" smtClean="0"/>
               <a:t>Click to edit Master text styles</a:t>
             </a:r>
-            <a:endParaRPr lang="en-US" smtClean="0"/>
           </a:p>
         </p:txBody>
       </p:sp>
@@ -2501,6 +2641,7 @@
           <a:p>
             <a:fld id="{5BCAD085-E8A6-8845-BD4E-CB4CCA059FC4}" type="datetimeFigureOut">
               <a:rPr lang="en-US" smtClean="0"/>
+              <a:t>1/27/13</a:t>
             </a:fld>
             <a:endParaRPr lang="en-US"/>
           </a:p>
@@ -2542,12 +2683,18 @@
           <a:p>
             <a:fld id="{C1FF6DA9-008F-8B48-92A6-B652298478BF}" type="slidenum">
               <a:rPr lang="en-US" smtClean="0"/>
+              <a:t>‹#›</a:t>
             </a:fld>
             <a:endParaRPr lang="en-US"/>
           </a:p>
         </p:txBody>
       </p:sp>
     </p:spTree>
+    <p:extLst>
+      <p:ext uri="{BB962C8B-B14F-4D97-AF65-F5344CB8AC3E}">
+        <p14:creationId xmlns:p14="http://schemas.microsoft.com/office/powerpoint/2010/main" val="3889236939"/>
+      </p:ext>
+    </p:extLst>
   </p:cSld>
   <p:clrMapOvr>
     <a:masterClrMapping/>
@@ -2640,7 +2787,6 @@
               <a:rPr lang="en-US" smtClean="0"/>
               <a:t>Click to edit Master text styles</a:t>
             </a:r>
-            <a:endParaRPr lang="en-US" smtClean="0"/>
           </a:p>
           <a:p>
             <a:pPr lvl="1"/>
@@ -2648,7 +2794,6 @@
               <a:rPr lang="en-US" smtClean="0"/>
               <a:t>Second level</a:t>
             </a:r>
-            <a:endParaRPr lang="en-US" smtClean="0"/>
           </a:p>
           <a:p>
             <a:pPr lvl="2"/>
@@ -2656,7 +2801,6 @@
               <a:rPr lang="en-US" smtClean="0"/>
               <a:t>Third level</a:t>
             </a:r>
-            <a:endParaRPr lang="en-US" smtClean="0"/>
           </a:p>
           <a:p>
             <a:pPr lvl="3"/>
@@ -2664,7 +2808,6 @@
               <a:rPr lang="en-US" smtClean="0"/>
               <a:t>Fourth level</a:t>
             </a:r>
-            <a:endParaRPr lang="en-US" smtClean="0"/>
           </a:p>
           <a:p>
             <a:pPr lvl="4"/>
@@ -2711,6 +2854,7 @@
           <a:p>
             <a:fld id="{5BCAD085-E8A6-8845-BD4E-CB4CCA059FC4}" type="datetimeFigureOut">
               <a:rPr lang="en-US" smtClean="0"/>
+              <a:t>1/27/13</a:t>
             </a:fld>
             <a:endParaRPr lang="en-US"/>
           </a:p>
@@ -2788,12 +2932,18 @@
           <a:p>
             <a:fld id="{C1FF6DA9-008F-8B48-92A6-B652298478BF}" type="slidenum">
               <a:rPr lang="en-US" smtClean="0"/>
+              <a:t>‹#›</a:t>
             </a:fld>
             <a:endParaRPr lang="en-US"/>
           </a:p>
         </p:txBody>
       </p:sp>
     </p:spTree>
+    <p:extLst>
+      <p:ext uri="{BB962C8B-B14F-4D97-AF65-F5344CB8AC3E}">
+        <p14:creationId xmlns:p14="http://schemas.microsoft.com/office/powerpoint/2010/main" val="2209977519"/>
+      </p:ext>
+    </p:extLst>
   </p:cSld>
   <p:clrMap bg1="lt1" tx1="dk1" bg2="lt2" tx2="dk2" accent1="accent1" accent2="accent2" accent3="accent3" accent4="accent4" accent5="accent5" accent6="accent6" hlink="hlink" folHlink="folHlink"/>
   <p:sldLayoutIdLst>
@@ -2831,7 +2981,7 @@
         <a:spcBef>
           <a:spcPct val="20000"/>
         </a:spcBef>
-        <a:buFont typeface="Arial" panose="020B0604020202020204"/>
+        <a:buFont typeface="Arial"/>
         <a:buChar char="•"/>
         <a:defRPr sz="3200" kern="1200">
           <a:solidFill>
@@ -2846,7 +2996,7 @@
         <a:spcBef>
           <a:spcPct val="20000"/>
         </a:spcBef>
-        <a:buFont typeface="Arial" panose="020B0604020202020204"/>
+        <a:buFont typeface="Arial"/>
         <a:buChar char="–"/>
         <a:defRPr sz="2800" kern="1200">
           <a:solidFill>
@@ -2861,7 +3011,7 @@
         <a:spcBef>
           <a:spcPct val="20000"/>
         </a:spcBef>
-        <a:buFont typeface="Arial" panose="020B0604020202020204"/>
+        <a:buFont typeface="Arial"/>
         <a:buChar char="•"/>
         <a:defRPr sz="2400" kern="1200">
           <a:solidFill>
@@ -2876,7 +3026,7 @@
         <a:spcBef>
           <a:spcPct val="20000"/>
         </a:spcBef>
-        <a:buFont typeface="Arial" panose="020B0604020202020204"/>
+        <a:buFont typeface="Arial"/>
         <a:buChar char="–"/>
         <a:defRPr sz="2000" kern="1200">
           <a:solidFill>
@@ -2891,7 +3041,7 @@
         <a:spcBef>
           <a:spcPct val="20000"/>
         </a:spcBef>
-        <a:buFont typeface="Arial" panose="020B0604020202020204"/>
+        <a:buFont typeface="Arial"/>
         <a:buChar char="»"/>
         <a:defRPr sz="2000" kern="1200">
           <a:solidFill>
@@ -2906,7 +3056,7 @@
         <a:spcBef>
           <a:spcPct val="20000"/>
         </a:spcBef>
-        <a:buFont typeface="Arial" panose="020B0604020202020204"/>
+        <a:buFont typeface="Arial"/>
         <a:buChar char="•"/>
         <a:defRPr sz="2000" kern="1200">
           <a:solidFill>
@@ -2921,7 +3071,7 @@
         <a:spcBef>
           <a:spcPct val="20000"/>
         </a:spcBef>
-        <a:buFont typeface="Arial" panose="020B0604020202020204"/>
+        <a:buFont typeface="Arial"/>
         <a:buChar char="•"/>
         <a:defRPr sz="2000" kern="1200">
           <a:solidFill>
@@ -2936,7 +3086,7 @@
         <a:spcBef>
           <a:spcPct val="20000"/>
         </a:spcBef>
-        <a:buFont typeface="Arial" panose="020B0604020202020204"/>
+        <a:buFont typeface="Arial"/>
         <a:buChar char="•"/>
         <a:defRPr sz="2000" kern="1200">
           <a:solidFill>
@@ -2951,7 +3101,7 @@
         <a:spcBef>
           <a:spcPct val="20000"/>
         </a:spcBef>
-        <a:buFont typeface="Arial" panose="020B0604020202020204"/>
+        <a:buFont typeface="Arial"/>
         <a:buChar char="•"/>
         <a:defRPr sz="2000" kern="1200">
           <a:solidFill>
@@ -3063,7 +3213,7 @@
 </file>
 
 <file path=ppt/slides/slide1.xml><?xml version="1.0" encoding="utf-8"?>
-<p:sld xmlns:a="http://schemas.openxmlformats.org/drawingml/2006/main" xmlns:r="http://schemas.openxmlformats.org/officeDocument/2006/relationships" xmlns:p="http://schemas.openxmlformats.org/presentationml/2006/main">
+<p:sld xmlns:a="http://schemas.openxmlformats.org/drawingml/2006/main" xmlns:p="http://schemas.openxmlformats.org/presentationml/2006/main" xmlns:r="http://schemas.openxmlformats.org/officeDocument/2006/relationships">
   <p:cSld>
     <p:spTree>
       <p:nvGrpSpPr>
@@ -3079,65 +3229,47 @@
             <a:spLocks noGrp="1"/>
           </p:cNvSpPr>
           <p:nvPr>
-            <p:ph type="title"/>
-          </p:nvPr>
-        </p:nvSpPr>
-        <p:spPr/>
-        <p:txBody>
-          <a:bodyPr/>
-          <a:lstStyle/>
-          <a:p>
-            <a:r>
-              <a:t>PHÂN TÍCH BÁN LẺ</a:t>
-            </a:r>
-          </a:p>
-          <a:p>
-            <a:r>
-              <a:t>PHÂN KHÚC KHÁCH HÀNG &amp; PHÂN TÍCH GIỎ HÀNG</a:t>
-            </a:r>
-          </a:p>
-        </p:txBody>
-      </p:sp>
-      <p:sp>
-        <p:nvSpPr>
-          <p:cNvPr id="3" name="TextBox 2"/>
-          <p:cNvSpPr txBox="1"/>
-          <p:nvPr/>
-        </p:nvSpPr>
-        <p:spPr>
-          <a:xfrm>
-            <a:off x="640080" y="1828800"/>
-            <a:ext cx="8229600" cy="2286000"/>
-          </a:xfrm>
-          <a:prstGeom prst="rect">
-            <a:avLst/>
-          </a:prstGeom>
-          <a:noFill/>
-        </p:spPr>
-        <p:txBody>
-          <a:bodyPr wrap="square">
-            <a:spAutoFit/>
-          </a:bodyPr>
-          <a:lstStyle/>
-          <a:p/>
-          <a:p>
-            <a:r>
-              <a:t>Sinh viên: NGUYỄN ĐỨC BÌNH (MSE13183)</a:t>
-            </a:r>
-          </a:p>
-          <a:p>
-            <a:r>
-              <a:t>Giảng viên hướng dẫn: Phan Duy Hùng</a:t>
-            </a:r>
-          </a:p>
-          <a:p>
-            <a:r>
-              <a:t>Ngày nộp: 11/08/2025</a:t>
-            </a:r>
-          </a:p>
-          <a:p>
-            <a:r>
-              <a:t>Nguồn dữ liệu: Kaggle – Retail Analysis on Large Dataset</a:t>
+            <p:ph type="ctrTitle"/>
+          </p:nvPr>
+        </p:nvSpPr>
+        <p:spPr/>
+        <p:txBody>
+          <a:bodyPr/>
+          <a:lstStyle/>
+          <a:p>
+            <a:r>
+              <a:t>PHÂN TÍCH GIỎ HÀNG (MARKET BASKET ANALYSIS)</a:t>
+            </a:r>
+          </a:p>
+          <a:p>
+            <a:r>
+              <a:t>BÁN LẺ – DỮ LIỆU GIAO DỊCH</a:t>
+            </a:r>
+          </a:p>
+        </p:txBody>
+      </p:sp>
+      <p:sp>
+        <p:nvSpPr>
+          <p:cNvPr id="3" name="Subtitle 2"/>
+          <p:cNvSpPr>
+            <a:spLocks noGrp="1"/>
+          </p:cNvSpPr>
+          <p:nvPr>
+            <p:ph type="subTitle" idx="1"/>
+          </p:nvPr>
+        </p:nvSpPr>
+        <p:spPr/>
+        <p:txBody>
+          <a:bodyPr/>
+          <a:lstStyle/>
+          <a:p>
+            <a:r>
+              <a:t>Nguyễn Đức Bình • Python 3.13.1 (Apriori / FP-Growth • FP-Max)</a:t>
+            </a:r>
+          </a:p>
+          <a:p>
+            <a:r>
+              <a:t>Môn: DAM501.8 – Phát triển ứng dụng IoT (phần dữ liệu)</a:t>
             </a:r>
           </a:p>
         </p:txBody>
@@ -3151,7 +3283,7 @@
 </file>
 
 <file path=ppt/slides/slide10.xml><?xml version="1.0" encoding="utf-8"?>
-<p:sld xmlns:a="http://schemas.openxmlformats.org/drawingml/2006/main" xmlns:r="http://schemas.openxmlformats.org/officeDocument/2006/relationships" xmlns:p="http://schemas.openxmlformats.org/presentationml/2006/main">
+<p:sld xmlns:a="http://schemas.openxmlformats.org/drawingml/2006/main" xmlns:p="http://schemas.openxmlformats.org/presentationml/2006/main" xmlns:r="http://schemas.openxmlformats.org/officeDocument/2006/relationships">
   <p:cSld>
     <p:spTree>
       <p:nvGrpSpPr>
@@ -3176,35 +3308,45 @@
           <a:lstStyle/>
           <a:p>
             <a:r>
-              <a:t>5) RFM: Tần suất vs. Doanh thu</a:t>
-            </a:r>
-          </a:p>
-        </p:txBody>
-      </p:sp>
-      <p:pic>
-        <p:nvPicPr>
-          <p:cNvPr id="3" name="Picture 2" descr="rfm_scatter_v2.png"/>
-          <p:cNvPicPr>
-            <a:picLocks noChangeAspect="1"/>
-          </p:cNvPicPr>
-          <p:nvPr/>
-        </p:nvPicPr>
-        <p:blipFill>
-          <a:blip r:embed="rId1"/>
-          <a:stretch>
-            <a:fillRect/>
-          </a:stretch>
-        </p:blipFill>
-        <p:spPr>
-          <a:xfrm>
-            <a:off x="640080" y="1371600"/>
-            <a:ext cx="7863840" cy="4684524"/>
-          </a:xfrm>
-          <a:prstGeom prst="rect">
-            <a:avLst/>
-          </a:prstGeom>
-        </p:spPr>
-      </p:pic>
+              <a:t>Hạn chế &amp; Rủi ro</a:t>
+            </a:r>
+          </a:p>
+        </p:txBody>
+      </p:sp>
+      <p:sp>
+        <p:nvSpPr>
+          <p:cNvPr id="3" name="Content Placeholder 2"/>
+          <p:cNvSpPr>
+            <a:spLocks noGrp="1"/>
+          </p:cNvSpPr>
+          <p:nvPr>
+            <p:ph idx="1"/>
+          </p:nvPr>
+        </p:nvSpPr>
+        <p:spPr/>
+        <p:txBody>
+          <a:bodyPr/>
+          <a:lstStyle/>
+          <a:p>
+            <a:pPr/>
+            <a:r>
+              <a:t>Dữ liệu thưa: chỉ 4,070/294,188 giao dịch có ≥2 món; chỉ 5 nhóm hàng.</a:t>
+            </a:r>
+          </a:p>
+          <a:p>
+            <a:pPr/>
+            <a:r>
+              <a:t>Chưa xét mùa vụ/khuyến mãi/địa lý; rule mining không thể hiện nhân‑quả.</a:t>
+            </a:r>
+          </a:p>
+          <a:p>
+            <a:pPr/>
+            <a:r>
+              <a:t>Cần kiểm tra độ ổn định luật theo thời gian / theo phân khúc khách hàng.</a:t>
+            </a:r>
+          </a:p>
+        </p:txBody>
+      </p:sp>
     </p:spTree>
   </p:cSld>
   <p:clrMapOvr>
@@ -3214,7 +3356,7 @@
 </file>
 
 <file path=ppt/slides/slide11.xml><?xml version="1.0" encoding="utf-8"?>
-<p:sld xmlns:a="http://schemas.openxmlformats.org/drawingml/2006/main" xmlns:r="http://schemas.openxmlformats.org/officeDocument/2006/relationships" xmlns:p="http://schemas.openxmlformats.org/presentationml/2006/main">
+<p:sld xmlns:a="http://schemas.openxmlformats.org/drawingml/2006/main" xmlns:p="http://schemas.openxmlformats.org/presentationml/2006/main" xmlns:r="http://schemas.openxmlformats.org/officeDocument/2006/relationships">
   <p:cSld>
     <p:spTree>
       <p:nvGrpSpPr>
@@ -3239,7 +3381,7 @@
           <a:lstStyle/>
           <a:p>
             <a:r>
-              <a:t>6) Insight &amp; Khuyến nghị</a:t>
+              <a:t>Hướng phát triển</a:t>
             </a:r>
           </a:p>
         </p:txBody>
@@ -3258,25 +3400,28 @@
         <p:txBody>
           <a:bodyPr/>
           <a:lstStyle/>
-          <a:p/>
-          <a:p>
-            <a:r>
-              <a:t>• Bundle/bán chéo theo luật có lift &gt; 1; gợi ý sản phẩm trong giỏ.</a:t>
-            </a:r>
-          </a:p>
-          <a:p>
-            <a:r>
-              <a:t>• Tận dụng mùa cao điểm để lên lịch khuyến mãi/stocking.</a:t>
-            </a:r>
-          </a:p>
-          <a:p>
-            <a:r>
-              <a:t>• VIP/Potential: ưu đãi/loyalty; Regular/Churn-risk: win-back (voucher, cá nhân hoá).</a:t>
-            </a:r>
-          </a:p>
-          <a:p>
-            <a:r>
-              <a:t>• Tăng số món/đơn qua free-ship theo ngưỡng, combo giá tốt.</a:t>
+          <a:p>
+            <a:pPr/>
+            <a:r>
+              <a:t>Gom giỏ theo Customer + Date để tăng số item/giỏ.</a:t>
+            </a:r>
+          </a:p>
+          <a:p>
+            <a:pPr/>
+            <a:r>
+              <a:t>So sánh Apriori vs FP‑Growth về thời gian &amp; chất lượng luật.</a:t>
+            </a:r>
+          </a:p>
+          <a:p>
+            <a:pPr/>
+            <a:r>
+              <a:t>Thử thêm thuộc tính Brand/Type vào item thay vì chỉ Category.</a:t>
+            </a:r>
+          </a:p>
+          <a:p>
+            <a:pPr/>
+            <a:r>
+              <a:t>Triển khai thử nghiệm A/B cho gợi ý combo.</a:t>
             </a:r>
           </a:p>
         </p:txBody>
@@ -3290,7 +3435,7 @@
 </file>
 
 <file path=ppt/slides/slide12.xml><?xml version="1.0" encoding="utf-8"?>
-<p:sld xmlns:a="http://schemas.openxmlformats.org/drawingml/2006/main" xmlns:r="http://schemas.openxmlformats.org/officeDocument/2006/relationships" xmlns:p="http://schemas.openxmlformats.org/presentationml/2006/main">
+<p:sld xmlns:a="http://schemas.openxmlformats.org/drawingml/2006/main" xmlns:p="http://schemas.openxmlformats.org/presentationml/2006/main" xmlns:r="http://schemas.openxmlformats.org/officeDocument/2006/relationships">
   <p:cSld>
     <p:spTree>
       <p:nvGrpSpPr>
@@ -3315,7 +3460,7 @@
           <a:lstStyle/>
           <a:p>
             <a:r>
-              <a:t>Kết luận</a:t>
+              <a:t>Checklist nộp bài</a:t>
             </a:r>
           </a:p>
         </p:txBody>
@@ -3334,20 +3479,94 @@
         <p:txBody>
           <a:bodyPr/>
           <a:lstStyle/>
-          <a:p/>
-          <a:p>
-            <a:r>
-              <a:t>Pipeline hoàn chỉnh: EDA → Giỏ hàng → RFM, kèm file CSV/JSON có thể tái sử dụng.</a:t>
-            </a:r>
-          </a:p>
-          <a:p>
-            <a:r>
-              <a:t>Hướng mở rộng: hạ ngưỡng để tăng số luật, thử FP-Growth/FPMax, mô hình gợi ý, A/B test.</a:t>
-            </a:r>
-          </a:p>
-          <a:p>
-            <a:r>
-              <a:t>Xin cảm ơn!</a:t>
+          <a:p>
+            <a:pPr/>
+            <a:r>
+              <a:t>Dataset + notebook/code (Python).</a:t>
+            </a:r>
+          </a:p>
+          <a:p>
+            <a:pPr/>
+            <a:r>
+              <a:t>Ảnh chứng chỉ Coursera (đã hoàn thành khoá).</a:t>
+            </a:r>
+          </a:p>
+          <a:p>
+            <a:pPr/>
+            <a:r>
+              <a:t>Slide thuyết trình (file này) + chèn Top‑10 luật.</a:t>
+            </a:r>
+          </a:p>
+          <a:p>
+            <a:pPr/>
+            <a:r>
+              <a:t>Share link Drive ở chế độ shared tới: hungbkhn@gmail.com</a:t>
+            </a:r>
+          </a:p>
+          <a:p>
+            <a:pPr/>
+            <a:r>
+              <a:t>Tiêu đề email: MSE K23HN_DAM501_Fullname</a:t>
+            </a:r>
+          </a:p>
+        </p:txBody>
+      </p:sp>
+    </p:spTree>
+  </p:cSld>
+  <p:clrMapOvr>
+    <a:masterClrMapping/>
+  </p:clrMapOvr>
+</p:sld>
+</file>
+
+<file path=ppt/slides/slide13.xml><?xml version="1.0" encoding="utf-8"?>
+<p:sld xmlns:a="http://schemas.openxmlformats.org/drawingml/2006/main" xmlns:p="http://schemas.openxmlformats.org/presentationml/2006/main" xmlns:r="http://schemas.openxmlformats.org/officeDocument/2006/relationships">
+  <p:cSld>
+    <p:spTree>
+      <p:nvGrpSpPr>
+        <p:cNvPr id="1" name=""/>
+        <p:cNvGrpSpPr/>
+        <p:nvPr/>
+      </p:nvGrpSpPr>
+      <p:grpSpPr/>
+      <p:sp>
+        <p:nvSpPr>
+          <p:cNvPr id="2" name="Title 1"/>
+          <p:cNvSpPr>
+            <a:spLocks noGrp="1"/>
+          </p:cNvSpPr>
+          <p:nvPr>
+            <p:ph type="title"/>
+          </p:nvPr>
+        </p:nvSpPr>
+        <p:spPr/>
+        <p:txBody>
+          <a:bodyPr/>
+          <a:lstStyle/>
+          <a:p>
+            <a:r>
+              <a:t>Hỏi &amp; Đáp (Q&amp;A)</a:t>
+            </a:r>
+          </a:p>
+        </p:txBody>
+      </p:sp>
+      <p:sp>
+        <p:nvSpPr>
+          <p:cNvPr id="3" name="Text Placeholder 2"/>
+          <p:cNvSpPr>
+            <a:spLocks noGrp="1"/>
+          </p:cNvSpPr>
+          <p:nvPr>
+            <p:ph type="body" idx="1"/>
+          </p:nvPr>
+        </p:nvSpPr>
+        <p:spPr/>
+        <p:txBody>
+          <a:bodyPr/>
+          <a:lstStyle/>
+          <a:p>
+            <a:r>
+              <a:t>Xin cảm ơn thầy/cô và các bạn!</a:t>
             </a:r>
           </a:p>
         </p:txBody>
@@ -3361,7 +3580,7 @@
 </file>
 
 <file path=ppt/slides/slide2.xml><?xml version="1.0" encoding="utf-8"?>
-<p:sld xmlns:a="http://schemas.openxmlformats.org/drawingml/2006/main" xmlns:r="http://schemas.openxmlformats.org/officeDocument/2006/relationships" xmlns:p="http://schemas.openxmlformats.org/presentationml/2006/main">
+<p:sld xmlns:a="http://schemas.openxmlformats.org/drawingml/2006/main" xmlns:p="http://schemas.openxmlformats.org/presentationml/2006/main" xmlns:r="http://schemas.openxmlformats.org/officeDocument/2006/relationships">
   <p:cSld>
     <p:spTree>
       <p:nvGrpSpPr>
@@ -3405,35 +3624,46 @@
         <p:txBody>
           <a:bodyPr/>
           <a:lstStyle/>
-          <a:p/>
-          <a:p>
-            <a:r>
-              <a:t>1. Mục tiêu &amp; Dữ liệu</a:t>
-            </a:r>
-          </a:p>
-          <a:p>
-            <a:r>
-              <a:t>2. Quy trình &amp; Tham số</a:t>
-            </a:r>
-          </a:p>
-          <a:p>
-            <a:r>
-              <a:t>3. Kết quả EDA</a:t>
-            </a:r>
-          </a:p>
-          <a:p>
-            <a:r>
-              <a:t>4. Khai thác giỏ hàng (Association Rules)</a:t>
-            </a:r>
-          </a:p>
-          <a:p>
-            <a:r>
-              <a:t>5. Phân khúc khách hàng (RFM)</a:t>
-            </a:r>
-          </a:p>
-          <a:p>
-            <a:r>
-              <a:t>6. Insight &amp; Khuyến nghị</a:t>
+          <a:p>
+            <a:pPr/>
+            <a:r>
+              <a:t>Mục tiêu &amp; Yêu cầu đề tài</a:t>
+            </a:r>
+          </a:p>
+          <a:p>
+            <a:pPr/>
+            <a:r>
+              <a:t>Tổng quan dữ liệu (EDA)</a:t>
+            </a:r>
+          </a:p>
+          <a:p>
+            <a:pPr/>
+            <a:r>
+              <a:t>Phương pháp: Apriori vs. FP-Growth / FP-Max</a:t>
+            </a:r>
+          </a:p>
+          <a:p>
+            <a:pPr/>
+            <a:r>
+              <a:t>Lựa chọn tham số: min_support, min_confidence, lift</a:t>
+            </a:r>
+          </a:p>
+          <a:p>
+            <a:pPr/>
+            <a:r>
+              <a:t>Kết quả &amp; Nhận định</a:t>
+            </a:r>
+          </a:p>
+          <a:p>
+            <a:pPr/>
+            <a:r>
+              <a:t>Hạn chế &amp; Rủi ro</a:t>
+            </a:r>
+          </a:p>
+          <a:p>
+            <a:pPr/>
+            <a:r>
+              <a:t>Hướng phát triển &amp; Checklist nộp bài</a:t>
             </a:r>
           </a:p>
         </p:txBody>
@@ -3447,7 +3677,7 @@
 </file>
 
 <file path=ppt/slides/slide3.xml><?xml version="1.0" encoding="utf-8"?>
-<p:sld xmlns:a="http://schemas.openxmlformats.org/drawingml/2006/main" xmlns:r="http://schemas.openxmlformats.org/officeDocument/2006/relationships" xmlns:p="http://schemas.openxmlformats.org/presentationml/2006/main">
+<p:sld xmlns:a="http://schemas.openxmlformats.org/drawingml/2006/main" xmlns:p="http://schemas.openxmlformats.org/presentationml/2006/main" xmlns:r="http://schemas.openxmlformats.org/officeDocument/2006/relationships">
   <p:cSld>
     <p:spTree>
       <p:nvGrpSpPr>
@@ -3472,7 +3702,7 @@
           <a:lstStyle/>
           <a:p>
             <a:r>
-              <a:t>1) Mục tiêu &amp; Dữ liệu</a:t>
+              <a:t>Yêu cầu của thầy (theo đề)</a:t>
             </a:r>
           </a:p>
         </p:txBody>
@@ -3491,20 +3721,46 @@
         <p:txBody>
           <a:bodyPr/>
           <a:lstStyle/>
-          <a:p/>
-          <a:p>
-            <a:r>
-              <a:t>• Mục tiêu: phát hiện sản phẩm thường mua cùng &amp; phân khúc khách hàng để tối ưu marketing.</a:t>
-            </a:r>
-          </a:p>
-          <a:p>
-            <a:r>
-              <a:t>• Dữ liệu: giao dịch (Transaction_ID, Customer_ID, Date/Time, Product_Type, Amount...).</a:t>
-            </a:r>
-          </a:p>
-          <a:p>
-            <a:r>
-              <a:t>• Thời gian: 03/2023 – 02/2024 (khoảng 12 tháng).</a:t>
+          <a:p>
+            <a:pPr/>
+            <a:r>
+              <a:t>Chọn 1 dataset (Kaggle list). Lập trình Python để khai thác tập phổ biến &amp; luật kết hợp.</a:t>
+            </a:r>
+          </a:p>
+          <a:p>
+            <a:pPr/>
+            <a:r>
+              <a:t>ID chẵn: dùng maxFP‑growth / FP‑Max để khai thác tập phổ biến; sinh Association Rules.</a:t>
+            </a:r>
+          </a:p>
+          <a:p>
+            <a:pPr/>
+            <a:r>
+              <a:t>ID lẻ: dùng Apriori để khai thác tập phổ biến; sinh Association Rules.</a:t>
+            </a:r>
+          </a:p>
+          <a:p>
+            <a:pPr/>
+            <a:r>
+              <a:t>Tự đưa ra giả thiết &amp; chọn giá trị min_support, min_confidence; giải thích cách chọn.</a:t>
+            </a:r>
+          </a:p>
+          <a:p>
+            <a:pPr/>
+            <a:r>
+              <a:t>Nộp: files dataset, file notebook/code + ảnh chứng chỉ Coursera (đã hoàn thành).</a:t>
+            </a:r>
+          </a:p>
+          <a:p>
+            <a:pPr/>
+            <a:r>
+              <a:t>Trình bày online vào buổi cuối (theo lịch).</a:t>
+            </a:r>
+          </a:p>
+          <a:p>
+            <a:pPr/>
+            <a:r>
+              <a:t>Tiêu đề email: MSE K23HN_DAM501_Fullname; Share Drive (shared mode) tới: hungbkhn@gmail.com</a:t>
             </a:r>
           </a:p>
         </p:txBody>
@@ -3518,7 +3774,7 @@
 </file>
 
 <file path=ppt/slides/slide4.xml><?xml version="1.0" encoding="utf-8"?>
-<p:sld xmlns:a="http://schemas.openxmlformats.org/drawingml/2006/main" xmlns:r="http://schemas.openxmlformats.org/officeDocument/2006/relationships" xmlns:p="http://schemas.openxmlformats.org/presentationml/2006/main">
+<p:sld xmlns:a="http://schemas.openxmlformats.org/drawingml/2006/main" xmlns:p="http://schemas.openxmlformats.org/presentationml/2006/main" xmlns:r="http://schemas.openxmlformats.org/officeDocument/2006/relationships">
   <p:cSld>
     <p:spTree>
       <p:nvGrpSpPr>
@@ -3543,7 +3799,7 @@
           <a:lstStyle/>
           <a:p>
             <a:r>
-              <a:t>2) Quy trình &amp; Tham số</a:t>
+              <a:t>Tổng quan dữ liệu</a:t>
             </a:r>
           </a:p>
         </p:txBody>
@@ -3555,7 +3811,7 @@
             <a:spLocks noGrp="1"/>
           </p:cNvSpPr>
           <p:nvPr>
-            <p:ph idx="1"/>
+            <p:ph idx="1" sz="half"/>
           </p:nvPr>
         </p:nvSpPr>
         <p:spPr/>
@@ -3564,18 +3820,156 @@
           <a:lstStyle/>
           <a:p/>
           <a:p>
-            <a:r>
-              <a:t>• Tiền xử lý: lọc đơn hoàn tất, làm sạch sản phẩm, tạo revenue, year_month.</a:t>
-            </a:r>
-          </a:p>
-          <a:p>
-            <a:r>
-              <a:t>• Giỏ hàng: Fallback Apriori | min_support=— | min_confidence=—.</a:t>
-            </a:r>
-          </a:p>
-          <a:p>
-            <a:r>
-              <a:t>• Phân khúc: RFM (Recency, Frequency, Monetary) + KMeans (k=4).</a:t>
+            <a:pPr/>
+            <a:r>
+              <a:t>Số dòng: 302,010 | Số cột: 30</a:t>
+            </a:r>
+          </a:p>
+          <a:p>
+            <a:pPr/>
+            <a:r>
+              <a:t>Cột giao dịch (Transaction): Transaction_ID</a:t>
+            </a:r>
+          </a:p>
+          <a:p>
+            <a:pPr/>
+            <a:r>
+              <a:t>Cột mặt hàng (Item): Product_Category</a:t>
+            </a:r>
+          </a:p>
+          <a:p>
+            <a:pPr/>
+            <a:r>
+              <a:t>Tổng số giao dịch: 294,188</a:t>
+            </a:r>
+          </a:p>
+          <a:p>
+            <a:pPr/>
+            <a:r>
+              <a:t>Giao dịch có ≥2 mặt hàng: 4,070</a:t>
+            </a:r>
+          </a:p>
+          <a:p>
+            <a:pPr/>
+            <a:r>
+              <a:t>Số nhóm hàng (unique): 5</a:t>
+            </a:r>
+          </a:p>
+        </p:txBody>
+      </p:sp>
+      <p:sp>
+        <p:nvSpPr>
+          <p:cNvPr id="4" name="Content Placeholder 3"/>
+          <p:cNvSpPr>
+            <a:spLocks noGrp="1"/>
+          </p:cNvSpPr>
+          <p:nvPr>
+            <p:ph idx="2" sz="half"/>
+          </p:nvPr>
+        </p:nvSpPr>
+        <p:spPr/>
+        <p:txBody>
+          <a:bodyPr/>
+          <a:lstStyle/>
+          <a:p>
+            <a:r>
+              <a:t>Danh sách cột (rút gọn):</a:t>
+            </a:r>
+          </a:p>
+          <a:p>
+            <a:pPr lvl="1"/>
+            <a:r>
+              <a:t>• Transaction_ID</a:t>
+            </a:r>
+          </a:p>
+          <a:p>
+            <a:pPr lvl="1"/>
+            <a:r>
+              <a:t>• Customer_ID</a:t>
+            </a:r>
+          </a:p>
+          <a:p>
+            <a:pPr lvl="1"/>
+            <a:r>
+              <a:t>• Name</a:t>
+            </a:r>
+          </a:p>
+          <a:p>
+            <a:pPr lvl="1"/>
+            <a:r>
+              <a:t>• Email</a:t>
+            </a:r>
+          </a:p>
+          <a:p>
+            <a:pPr lvl="1"/>
+            <a:r>
+              <a:t>• Phone</a:t>
+            </a:r>
+          </a:p>
+          <a:p>
+            <a:pPr lvl="1"/>
+            <a:r>
+              <a:t>• Address</a:t>
+            </a:r>
+          </a:p>
+          <a:p>
+            <a:pPr lvl="1"/>
+            <a:r>
+              <a:t>• City</a:t>
+            </a:r>
+          </a:p>
+          <a:p>
+            <a:pPr lvl="1"/>
+            <a:r>
+              <a:t>• State</a:t>
+            </a:r>
+          </a:p>
+          <a:p>
+            <a:pPr lvl="1"/>
+            <a:r>
+              <a:t>• Zipcode</a:t>
+            </a:r>
+          </a:p>
+          <a:p>
+            <a:pPr lvl="1"/>
+            <a:r>
+              <a:t>• Country</a:t>
+            </a:r>
+          </a:p>
+          <a:p>
+            <a:pPr lvl="1"/>
+            <a:r>
+              <a:t>• Age</a:t>
+            </a:r>
+          </a:p>
+          <a:p>
+            <a:pPr lvl="1"/>
+            <a:r>
+              <a:t>• Gender</a:t>
+            </a:r>
+          </a:p>
+          <a:p>
+            <a:pPr lvl="1"/>
+            <a:r>
+              <a:t>• Income</a:t>
+            </a:r>
+          </a:p>
+          <a:p>
+            <a:pPr lvl="1"/>
+            <a:r>
+              <a:t>• Customer_Segment</a:t>
+            </a:r>
+          </a:p>
+          <a:p>
+            <a:pPr lvl="1"/>
+            <a:r>
+              <a:t>• Date</a:t>
+            </a:r>
+          </a:p>
+          <a:p>
+            <a:pPr lvl="1"/>
+            <a:r>
+              <a:t>... (+15 cột nữa)</a:t>
             </a:r>
           </a:p>
         </p:txBody>
@@ -3589,7 +3983,7 @@
 </file>
 
 <file path=ppt/slides/slide5.xml><?xml version="1.0" encoding="utf-8"?>
-<p:sld xmlns:a="http://schemas.openxmlformats.org/drawingml/2006/main" xmlns:r="http://schemas.openxmlformats.org/officeDocument/2006/relationships" xmlns:p="http://schemas.openxmlformats.org/presentationml/2006/main">
+<p:sld xmlns:a="http://schemas.openxmlformats.org/drawingml/2006/main" xmlns:p="http://schemas.openxmlformats.org/presentationml/2006/main" xmlns:r="http://schemas.openxmlformats.org/officeDocument/2006/relationships">
   <p:cSld>
     <p:spTree>
       <p:nvGrpSpPr>
@@ -3614,355 +4008,60 @@
           <a:lstStyle/>
           <a:p>
             <a:r>
-              <a:t>3) Doanh thu theo tháng</a:t>
-            </a:r>
-          </a:p>
-        </p:txBody>
-      </p:sp>
-      <p:pic>
-        <p:nvPicPr>
-          <p:cNvPr id="3" name="Picture 2" descr="revenue_by_month_v2.png"/>
-          <p:cNvPicPr>
-            <a:picLocks noChangeAspect="1"/>
-          </p:cNvPicPr>
-          <p:nvPr/>
-        </p:nvPicPr>
-        <p:blipFill>
-          <a:blip r:embed="rId1"/>
-          <a:stretch>
-            <a:fillRect/>
-          </a:stretch>
-        </p:blipFill>
-        <p:spPr>
-          <a:xfrm>
-            <a:off x="640080" y="1371600"/>
-            <a:ext cx="7863840" cy="4684524"/>
-          </a:xfrm>
-          <a:prstGeom prst="rect">
-            <a:avLst/>
-          </a:prstGeom>
-        </p:spPr>
-      </p:pic>
-    </p:spTree>
-  </p:cSld>
-  <p:clrMapOvr>
-    <a:masterClrMapping/>
-  </p:clrMapOvr>
-</p:sld>
-</file>
-
-<file path=ppt/slides/slide6.xml><?xml version="1.0" encoding="utf-8"?>
-<p:sld xmlns:a="http://schemas.openxmlformats.org/drawingml/2006/main" xmlns:r="http://schemas.openxmlformats.org/officeDocument/2006/relationships" xmlns:p="http://schemas.openxmlformats.org/presentationml/2006/main">
-  <p:cSld>
-    <p:spTree>
-      <p:nvGrpSpPr>
-        <p:cNvPr id="1" name=""/>
-        <p:cNvGrpSpPr/>
-        <p:nvPr/>
-      </p:nvGrpSpPr>
-      <p:grpSpPr/>
-      <p:sp>
-        <p:nvSpPr>
-          <p:cNvPr id="2" name="Title 1"/>
-          <p:cNvSpPr>
-            <a:spLocks noGrp="1"/>
-          </p:cNvSpPr>
-          <p:nvPr>
-            <p:ph type="title"/>
-          </p:nvPr>
-        </p:nvSpPr>
-        <p:spPr/>
-        <p:txBody>
-          <a:bodyPr/>
-          <a:lstStyle/>
-          <a:p>
-            <a:r>
-              <a:t>3) Top sản phẩm theo số lượng</a:t>
-            </a:r>
-          </a:p>
-        </p:txBody>
-      </p:sp>
-      <p:pic>
-        <p:nvPicPr>
-          <p:cNvPr id="3" name="Picture 2" descr="top_products_v2.png"/>
-          <p:cNvPicPr>
-            <a:picLocks noChangeAspect="1"/>
-          </p:cNvPicPr>
-          <p:nvPr/>
-        </p:nvPicPr>
-        <p:blipFill>
-          <a:blip r:embed="rId1"/>
-          <a:stretch>
-            <a:fillRect/>
-          </a:stretch>
-        </p:blipFill>
-        <p:spPr>
-          <a:xfrm>
-            <a:off x="365760" y="1371600"/>
-            <a:ext cx="4846320" cy="2883912"/>
-          </a:xfrm>
-          <a:prstGeom prst="rect">
-            <a:avLst/>
-          </a:prstGeom>
-        </p:spPr>
-      </p:pic>
+              <a:t>Top nhóm hàng (Product_Category)</a:t>
+            </a:r>
+          </a:p>
+        </p:txBody>
+      </p:sp>
+      <p:sp>
+        <p:nvSpPr>
+          <p:cNvPr id="3" name="Content Placeholder 2"/>
+          <p:cNvSpPr>
+            <a:spLocks noGrp="1"/>
+          </p:cNvSpPr>
+          <p:nvPr>
+            <p:ph idx="1" sz="half"/>
+          </p:nvPr>
+        </p:nvSpPr>
+        <p:spPr/>
+        <p:txBody>
+          <a:bodyPr/>
+          <a:lstStyle/>
+          <a:p/>
+        </p:txBody>
+      </p:sp>
+      <p:sp>
+        <p:nvSpPr>
+          <p:cNvPr id="4" name="Content Placeholder 3"/>
+          <p:cNvSpPr>
+            <a:spLocks noGrp="1"/>
+          </p:cNvSpPr>
+          <p:nvPr>
+            <p:ph idx="2" sz="half"/>
+          </p:nvPr>
+        </p:nvSpPr>
+        <p:spPr/>
+        <p:txBody>
+          <a:bodyPr/>
+          <a:lstStyle/>
+          <a:p/>
+        </p:txBody>
+      </p:sp>
       <p:graphicFrame>
         <p:nvGraphicFramePr>
-          <p:cNvPr id="4" name="Table 3"/>
+          <p:cNvPr id="5" name="Chart 4"/>
           <p:cNvGraphicFramePr>
             <a:graphicFrameLocks noGrp="1"/>
           </p:cNvGraphicFramePr>
           <p:nvPr/>
         </p:nvGraphicFramePr>
         <p:xfrm>
-          <a:off x="5577840" y="1371600"/>
-          <a:ext cx="2743200" cy="3200400"/>
+          <a:off x="640080" y="1645920"/>
+          <a:ext cx="7863840" cy="3931920"/>
         </p:xfrm>
         <a:graphic>
-          <a:graphicData uri="http://schemas.openxmlformats.org/drawingml/2006/table">
-            <a:tbl>
-              <a:tblPr firstRow="1" bandRow="1">
-                <a:tableStyleId>{5C22544A-7EE6-4342-B048-85BDC9FD1C3A}</a:tableStyleId>
-              </a:tblPr>
-              <a:tblGrid>
-                <a:gridCol w="1371600"/>
-                <a:gridCol w="1371600"/>
-              </a:tblGrid>
-              <a:tr h="355600">
-                <a:tc>
-                  <a:txBody>
-                    <a:bodyPr/>
-                    <a:lstStyle/>
-                    <a:p>
-                      <a:r>
-                        <a:t>product_name</a:t>
-                      </a:r>
-                    </a:p>
-                  </a:txBody>
-                  <a:tcPr/>
-                </a:tc>
-                <a:tc>
-                  <a:txBody>
-                    <a:bodyPr/>
-                    <a:lstStyle/>
-                    <a:p>
-                      <a:r>
-                        <a:t>quantity</a:t>
-                      </a:r>
-                    </a:p>
-                  </a:txBody>
-                  <a:tcPr/>
-                </a:tc>
-              </a:tr>
-              <a:tr h="355600">
-                <a:tc>
-                  <a:txBody>
-                    <a:bodyPr/>
-                    <a:lstStyle/>
-                    <a:p>
-                      <a:r>
-                        <a:t>Water</a:t>
-                      </a:r>
-                    </a:p>
-                  </a:txBody>
-                  <a:tcPr/>
-                </a:tc>
-                <a:tc>
-                  <a:txBody>
-                    <a:bodyPr/>
-                    <a:lstStyle/>
-                    <a:p>
-                      <a:r>
-                        <a:t>20042</a:t>
-                      </a:r>
-                    </a:p>
-                  </a:txBody>
-                  <a:tcPr/>
-                </a:tc>
-              </a:tr>
-              <a:tr h="355600">
-                <a:tc>
-                  <a:txBody>
-                    <a:bodyPr/>
-                    <a:lstStyle/>
-                    <a:p>
-                      <a:r>
-                        <a:t>Smartphone</a:t>
-                      </a:r>
-                    </a:p>
-                  </a:txBody>
-                  <a:tcPr/>
-                </a:tc>
-                <a:tc>
-                  <a:txBody>
-                    <a:bodyPr/>
-                    <a:lstStyle/>
-                    <a:p>
-                      <a:r>
-                        <a:t>15205</a:t>
-                      </a:r>
-                    </a:p>
-                  </a:txBody>
-                  <a:tcPr/>
-                </a:tc>
-              </a:tr>
-              <a:tr h="355600">
-                <a:tc>
-                  <a:txBody>
-                    <a:bodyPr/>
-                    <a:lstStyle/>
-                    <a:p>
-                      <a:r>
-                        <a:t>Non-Fiction</a:t>
-                      </a:r>
-                    </a:p>
-                  </a:txBody>
-                  <a:tcPr/>
-                </a:tc>
-                <a:tc>
-                  <a:txBody>
-                    <a:bodyPr/>
-                    <a:lstStyle/>
-                    <a:p>
-                      <a:r>
-                        <a:t>14920</a:t>
-                      </a:r>
-                    </a:p>
-                  </a:txBody>
-                  <a:tcPr/>
-                </a:tc>
-              </a:tr>
-              <a:tr h="355600">
-                <a:tc>
-                  <a:txBody>
-                    <a:bodyPr/>
-                    <a:lstStyle/>
-                    <a:p>
-                      <a:r>
-                        <a:t>Fiction</a:t>
-                      </a:r>
-                    </a:p>
-                  </a:txBody>
-                  <a:tcPr/>
-                </a:tc>
-                <a:tc>
-                  <a:txBody>
-                    <a:bodyPr/>
-                    <a:lstStyle/>
-                    <a:p>
-                      <a:r>
-                        <a:t>14897</a:t>
-                      </a:r>
-                    </a:p>
-                  </a:txBody>
-                  <a:tcPr/>
-                </a:tc>
-              </a:tr>
-              <a:tr h="355600">
-                <a:tc>
-                  <a:txBody>
-                    <a:bodyPr/>
-                    <a:lstStyle/>
-                    <a:p>
-                      <a:r>
-                        <a:t>Juice</a:t>
-                      </a:r>
-                    </a:p>
-                  </a:txBody>
-                  <a:tcPr/>
-                </a:tc>
-                <a:tc>
-                  <a:txBody>
-                    <a:bodyPr/>
-                    <a:lstStyle/>
-                    <a:p>
-                      <a:r>
-                        <a:t>10130</a:t>
-                      </a:r>
-                    </a:p>
-                  </a:txBody>
-                  <a:tcPr/>
-                </a:tc>
-              </a:tr>
-              <a:tr h="355600">
-                <a:tc>
-                  <a:txBody>
-                    <a:bodyPr/>
-                    <a:lstStyle/>
-                    <a:p>
-                      <a:r>
-                        <a:t>Television</a:t>
-                      </a:r>
-                    </a:p>
-                  </a:txBody>
-                  <a:tcPr/>
-                </a:tc>
-                <a:tc>
-                  <a:txBody>
-                    <a:bodyPr/>
-                    <a:lstStyle/>
-                    <a:p>
-                      <a:r>
-                        <a:t>10095</a:t>
-                      </a:r>
-                    </a:p>
-                  </a:txBody>
-                  <a:tcPr/>
-                </a:tc>
-              </a:tr>
-              <a:tr h="355600">
-                <a:tc>
-                  <a:txBody>
-                    <a:bodyPr/>
-                    <a:lstStyle/>
-                    <a:p>
-                      <a:r>
-                        <a:t>Decorations</a:t>
-                      </a:r>
-                    </a:p>
-                  </a:txBody>
-                  <a:tcPr/>
-                </a:tc>
-                <a:tc>
-                  <a:txBody>
-                    <a:bodyPr/>
-                    <a:lstStyle/>
-                    <a:p>
-                      <a:r>
-                        <a:t>10090</a:t>
-                      </a:r>
-                    </a:p>
-                  </a:txBody>
-                  <a:tcPr/>
-                </a:tc>
-              </a:tr>
-              <a:tr h="355600">
-                <a:tc>
-                  <a:txBody>
-                    <a:bodyPr/>
-                    <a:lstStyle/>
-                    <a:p>
-                      <a:r>
-                        <a:t>T-shirt</a:t>
-                      </a:r>
-                    </a:p>
-                  </a:txBody>
-                  <a:tcPr/>
-                </a:tc>
-                <a:tc>
-                  <a:txBody>
-                    <a:bodyPr/>
-                    <a:lstStyle/>
-                    <a:p>
-                      <a:r>
-                        <a:t>10051</a:t>
-                      </a:r>
-                    </a:p>
-                  </a:txBody>
-                  <a:tcPr/>
-                </a:tc>
-              </a:tr>
-            </a:tbl>
+          <a:graphicData uri="http://schemas.openxmlformats.org/drawingml/2006/chart">
+            <c:chart xmlns:c="http://schemas.openxmlformats.org/drawingml/2006/chart" r:id="rId2"/>
           </a:graphicData>
         </a:graphic>
       </p:graphicFrame>
@@ -3974,8 +4073,8 @@
 </p:sld>
 </file>
 
-<file path=ppt/slides/slide7.xml><?xml version="1.0" encoding="utf-8"?>
-<p:sld xmlns:a="http://schemas.openxmlformats.org/drawingml/2006/main" xmlns:r="http://schemas.openxmlformats.org/officeDocument/2006/relationships" xmlns:p="http://schemas.openxmlformats.org/presentationml/2006/main">
+<file path=ppt/slides/slide6.xml><?xml version="1.0" encoding="utf-8"?>
+<p:sld xmlns:a="http://schemas.openxmlformats.org/drawingml/2006/main" xmlns:p="http://schemas.openxmlformats.org/presentationml/2006/main" xmlns:r="http://schemas.openxmlformats.org/officeDocument/2006/relationships">
   <p:cSld>
     <p:spTree>
       <p:nvGrpSpPr>
@@ -4000,7 +4099,7 @@
           <a:lstStyle/>
           <a:p>
             <a:r>
-              <a:t>4) Khai thác giỏ hàng</a:t>
+              <a:t>Phương pháp</a:t>
             </a:r>
           </a:p>
         </p:txBody>
@@ -4019,20 +4118,119 @@
         <p:txBody>
           <a:bodyPr/>
           <a:lstStyle/>
-          <a:p/>
-          <a:p>
-            <a:r>
-              <a:t>• Số tập phổ biến: 32; Số luật: 0.</a:t>
-            </a:r>
-          </a:p>
-          <a:p>
-            <a:r>
-              <a:t>• Chỉ số: support (tỷ lệ), confidence (xác suất), lift (&gt;1 là tích cực).</a:t>
-            </a:r>
-          </a:p>
-          <a:p>
-            <a:r>
-              <a:t>• Nếu #luật thấp → giảm ngưỡng hoặc dùng Product_Type thay vì products.</a:t>
+          <a:p>
+            <a:pPr/>
+            <a:r>
+              <a:t>Tạo giỏ hàng: nhóm theo Transaction_ID → tập các Product_Category duy nhất/hoá đơn.</a:t>
+            </a:r>
+          </a:p>
+          <a:p>
+            <a:pPr/>
+            <a:r>
+              <a:t>Mã hoá one‑hot bằng TransactionEncoder</a:t>
+            </a:r>
+          </a:p>
+          <a:p>
+            <a:pPr/>
+            <a:r>
+              <a:t>Apriori (ID lẻ): duyệt theo mức, sinh ứng viên + cắt tỉa theo tính chất kháng đơn điệu.</a:t>
+            </a:r>
+          </a:p>
+          <a:p>
+            <a:pPr/>
+            <a:r>
+              <a:t>FP‑Growth (ID chẵn): nén dữ liệu bằng FP‑tree, khai thác không cần sinh ứng viên.</a:t>
+            </a:r>
+          </a:p>
+          <a:p>
+            <a:pPr/>
+            <a:r>
+              <a:t>FP‑Max (ID chẵn): tìm tập phổ biến tối đại (không có siêu tập nào cũng phổ biến).</a:t>
+            </a:r>
+          </a:p>
+          <a:p>
+            <a:pPr/>
+            <a:r>
+              <a:t>Association Rules: tính support, confidence, lift (thêm leverage, conviction).</a:t>
+            </a:r>
+          </a:p>
+        </p:txBody>
+      </p:sp>
+    </p:spTree>
+  </p:cSld>
+  <p:clrMapOvr>
+    <a:masterClrMapping/>
+  </p:clrMapOvr>
+</p:sld>
+</file>
+
+<file path=ppt/slides/slide7.xml><?xml version="1.0" encoding="utf-8"?>
+<p:sld xmlns:a="http://schemas.openxmlformats.org/drawingml/2006/main" xmlns:p="http://schemas.openxmlformats.org/presentationml/2006/main" xmlns:r="http://schemas.openxmlformats.org/officeDocument/2006/relationships">
+  <p:cSld>
+    <p:spTree>
+      <p:nvGrpSpPr>
+        <p:cNvPr id="1" name=""/>
+        <p:cNvGrpSpPr/>
+        <p:nvPr/>
+      </p:nvGrpSpPr>
+      <p:grpSpPr/>
+      <p:sp>
+        <p:nvSpPr>
+          <p:cNvPr id="2" name="Title 1"/>
+          <p:cNvSpPr>
+            <a:spLocks noGrp="1"/>
+          </p:cNvSpPr>
+          <p:nvPr>
+            <p:ph type="title"/>
+          </p:nvPr>
+        </p:nvSpPr>
+        <p:spPr/>
+        <p:txBody>
+          <a:bodyPr/>
+          <a:lstStyle/>
+          <a:p>
+            <a:r>
+              <a:t>Lựa chọn tham số (giải thích khi thuyết trình)</a:t>
+            </a:r>
+          </a:p>
+        </p:txBody>
+      </p:sp>
+      <p:sp>
+        <p:nvSpPr>
+          <p:cNvPr id="3" name="Content Placeholder 2"/>
+          <p:cNvSpPr>
+            <a:spLocks noGrp="1"/>
+          </p:cNvSpPr>
+          <p:nvPr>
+            <p:ph idx="1"/>
+          </p:nvPr>
+        </p:nvSpPr>
+        <p:spPr/>
+        <p:txBody>
+          <a:bodyPr/>
+          <a:lstStyle/>
+          <a:p>
+            <a:pPr/>
+            <a:r>
+              <a:t>min_support = k / N (N = 294,188 hoặc 4,070 nếu chỉ dùng giỏ ≥2 món).</a:t>
+            </a:r>
+          </a:p>
+          <a:p>
+            <a:pPr/>
+            <a:r>
+              <a:t>Dò lưới confidence: 0.8 → 0.1 (có thể hạ tới 0.01 khi dữ liệu rất thưa).</a:t>
+            </a:r>
+          </a:p>
+          <a:p>
+            <a:pPr/>
+            <a:r>
+              <a:t>Lọc lift ≥ 1.0 để ưu tiên luật có sức nâng.</a:t>
+            </a:r>
+          </a:p>
+          <a:p>
+            <a:pPr/>
+            <a:r>
+              <a:t>Mục tiêu số luật trình bày: 50–300; chọn cấu hình gần biên dưới nếu quá nhiều.</a:t>
             </a:r>
           </a:p>
         </p:txBody>
@@ -4046,7 +4244,7 @@
 </file>
 
 <file path=ppt/slides/slide8.xml><?xml version="1.0" encoding="utf-8"?>
-<p:sld xmlns:a="http://schemas.openxmlformats.org/drawingml/2006/main" xmlns:r="http://schemas.openxmlformats.org/officeDocument/2006/relationships" xmlns:p="http://schemas.openxmlformats.org/presentationml/2006/main">
+<p:sld xmlns:a="http://schemas.openxmlformats.org/drawingml/2006/main" xmlns:p="http://schemas.openxmlformats.org/presentationml/2006/main" xmlns:r="http://schemas.openxmlformats.org/officeDocument/2006/relationships">
   <p:cSld>
     <p:spTree>
       <p:nvGrpSpPr>
@@ -4071,7 +4269,7 @@
           <a:lstStyle/>
           <a:p>
             <a:r>
-              <a:t>5) Phân khúc khách hàng (RFM)</a:t>
+              <a:t>Kết quả thí nghiệm (chèn từ CSV)</a:t>
             </a:r>
           </a:p>
         </p:txBody>
@@ -4083,7 +4281,7 @@
             <a:spLocks noGrp="1"/>
           </p:cNvSpPr>
           <p:nvPr>
-            <p:ph idx="1"/>
+            <p:ph idx="1" sz="half"/>
           </p:nvPr>
         </p:nvSpPr>
         <p:spPr/>
@@ -4092,13 +4290,56 @@
           <a:lstStyle/>
           <a:p/>
           <a:p>
-            <a:r>
-              <a:t>• R: số ngày từ lần mua gần nhất; F: số lần mua; M: tổng chi tiêu.</a:t>
-            </a:r>
-          </a:p>
-          <a:p>
-            <a:r>
-              <a:t>• Thuật toán: KMeans (k=4), chuẩn hoá đặc trưng bằng RobustScaler.</a:t>
+            <a:pPr/>
+            <a:r>
+              <a:t>• frequent_itemsets.csv → thống kê số lượng theo độ dài (1, 2, 3…).</a:t>
+            </a:r>
+          </a:p>
+          <a:p>
+            <a:pPr/>
+            <a:r>
+              <a:t>• association_rules.csv → sắp xếp theo lift, confidence; chọn Top‑10 luật.</a:t>
+            </a:r>
+          </a:p>
+          <a:p>
+            <a:pPr/>
+            <a:r>
+              <a:t>• (ID chẵn) frequent_itemsets_maximal.csv → các tập tối đại (FP‑Max).</a:t>
+            </a:r>
+          </a:p>
+        </p:txBody>
+      </p:sp>
+      <p:sp>
+        <p:nvSpPr>
+          <p:cNvPr id="4" name="Content Placeholder 3"/>
+          <p:cNvSpPr>
+            <a:spLocks noGrp="1"/>
+          </p:cNvSpPr>
+          <p:nvPr>
+            <p:ph idx="2" sz="half"/>
+          </p:nvPr>
+        </p:nvSpPr>
+        <p:spPr/>
+        <p:txBody>
+          <a:bodyPr/>
+          <a:lstStyle/>
+          <a:p/>
+          <a:p>
+            <a:pPr/>
+            <a:r>
+              <a:t>Mẫu bảng để paste:</a:t>
+            </a:r>
+          </a:p>
+          <a:p>
+            <a:pPr/>
+            <a:r>
+              <a:t>antecedents → consequents | support | confidence | lift</a:t>
+            </a:r>
+          </a:p>
+          <a:p>
+            <a:pPr/>
+            <a:r>
+              <a:t>VD: {PARTY, PAPER CUP} → BALLOON | 0.012 | 0.38 | 1.26</a:t>
             </a:r>
           </a:p>
         </p:txBody>
@@ -4112,7 +4353,7 @@
 </file>
 
 <file path=ppt/slides/slide9.xml><?xml version="1.0" encoding="utf-8"?>
-<p:sld xmlns:a="http://schemas.openxmlformats.org/drawingml/2006/main" xmlns:r="http://schemas.openxmlformats.org/officeDocument/2006/relationships" xmlns:p="http://schemas.openxmlformats.org/presentationml/2006/main">
+<p:sld xmlns:a="http://schemas.openxmlformats.org/drawingml/2006/main" xmlns:p="http://schemas.openxmlformats.org/presentationml/2006/main" xmlns:r="http://schemas.openxmlformats.org/officeDocument/2006/relationships">
   <p:cSld>
     <p:spTree>
       <p:nvGrpSpPr>
@@ -4137,411 +4378,45 @@
           <a:lstStyle/>
           <a:p>
             <a:r>
-              <a:t>5) Bảng cụm RFM</a:t>
-            </a:r>
-          </a:p>
-        </p:txBody>
-      </p:sp>
-      <p:graphicFrame>
-        <p:nvGraphicFramePr>
-          <p:cNvPr id="3" name="Table 2"/>
-          <p:cNvGraphicFramePr>
-            <a:graphicFrameLocks noGrp="1"/>
-          </p:cNvGraphicFramePr>
-          <p:nvPr/>
-        </p:nvGraphicFramePr>
-        <p:xfrm>
-          <a:off x="457200" y="1371600"/>
-          <a:ext cx="8229600" cy="4114800"/>
-        </p:xfrm>
-        <a:graphic>
-          <a:graphicData uri="http://schemas.openxmlformats.org/drawingml/2006/table">
-            <a:tbl>
-              <a:tblPr firstRow="1" bandRow="1">
-                <a:tableStyleId>{5C22544A-7EE6-4342-B048-85BDC9FD1C3A}</a:tableStyleId>
-              </a:tblPr>
-              <a:tblGrid>
-                <a:gridCol w="1371600"/>
-                <a:gridCol w="1371600"/>
-                <a:gridCol w="1371600"/>
-                <a:gridCol w="1371600"/>
-                <a:gridCol w="1371600"/>
-                <a:gridCol w="1371600"/>
-              </a:tblGrid>
-              <a:tr h="822960">
-                <a:tc>
-                  <a:txBody>
-                    <a:bodyPr/>
-                    <a:lstStyle/>
-                    <a:p>
-                      <a:r>
-                        <a:t>cluster</a:t>
-                      </a:r>
-                    </a:p>
-                  </a:txBody>
-                  <a:tcPr/>
-                </a:tc>
-                <a:tc>
-                  <a:txBody>
-                    <a:bodyPr/>
-                    <a:lstStyle/>
-                    <a:p>
-                      <a:r>
-                        <a:t>cnt</a:t>
-                      </a:r>
-                    </a:p>
-                  </a:txBody>
-                  <a:tcPr/>
-                </a:tc>
-                <a:tc>
-                  <a:txBody>
-                    <a:bodyPr/>
-                    <a:lstStyle/>
-                    <a:p>
-                      <a:r>
-                        <a:t>recency_mean</a:t>
-                      </a:r>
-                    </a:p>
-                  </a:txBody>
-                  <a:tcPr/>
-                </a:tc>
-                <a:tc>
-                  <a:txBody>
-                    <a:bodyPr/>
-                    <a:lstStyle/>
-                    <a:p>
-                      <a:r>
-                        <a:t>frequency_mean</a:t>
-                      </a:r>
-                    </a:p>
-                  </a:txBody>
-                  <a:tcPr/>
-                </a:tc>
-                <a:tc>
-                  <a:txBody>
-                    <a:bodyPr/>
-                    <a:lstStyle/>
-                    <a:p>
-                      <a:r>
-                        <a:t>monetary_mean</a:t>
-                      </a:r>
-                    </a:p>
-                  </a:txBody>
-                  <a:tcPr/>
-                </a:tc>
-                <a:tc>
-                  <a:txBody>
-                    <a:bodyPr/>
-                    <a:lstStyle/>
-                    <a:p>
-                      <a:r>
-                        <a:t>segment</a:t>
-                      </a:r>
-                    </a:p>
-                  </a:txBody>
-                  <a:tcPr/>
-                </a:tc>
-              </a:tr>
-              <a:tr h="822960">
-                <a:tc>
-                  <a:txBody>
-                    <a:bodyPr/>
-                    <a:lstStyle/>
-                    <a:p>
-                      <a:r>
-                        <a:t>0</a:t>
-                      </a:r>
-                    </a:p>
-                  </a:txBody>
-                  <a:tcPr/>
-                </a:tc>
-                <a:tc>
-                  <a:txBody>
-                    <a:bodyPr/>
-                    <a:lstStyle/>
-                    <a:p>
-                      <a:r>
-                        <a:t>33810</a:t>
-                      </a:r>
-                    </a:p>
-                  </a:txBody>
-                  <a:tcPr/>
-                </a:tc>
-                <a:tc>
-                  <a:txBody>
-                    <a:bodyPr/>
-                    <a:lstStyle/>
-                    <a:p>
-                      <a:r>
-                        <a:t>67.4</a:t>
-                      </a:r>
-                    </a:p>
-                  </a:txBody>
-                  <a:tcPr/>
-                </a:tc>
-                <a:tc>
-                  <a:txBody>
-                    <a:bodyPr/>
-                    <a:lstStyle/>
-                    <a:p>
-                      <a:r>
-                        <a:t>2.51</a:t>
-                      </a:r>
-                    </a:p>
-                  </a:txBody>
-                  <a:tcPr/>
-                </a:tc>
-                <a:tc>
-                  <a:txBody>
-                    <a:bodyPr/>
-                    <a:lstStyle/>
-                    <a:p>
-                      <a:r>
-                        <a:t>651.66</a:t>
-                      </a:r>
-                    </a:p>
-                  </a:txBody>
-                  <a:tcPr/>
-                </a:tc>
-                <a:tc>
-                  <a:txBody>
-                    <a:bodyPr/>
-                    <a:lstStyle/>
-                    <a:p>
-                      <a:r>
-                        <a:t>Potential</a:t>
-                      </a:r>
-                    </a:p>
-                  </a:txBody>
-                  <a:tcPr/>
-                </a:tc>
-              </a:tr>
-              <a:tr h="822960">
-                <a:tc>
-                  <a:txBody>
-                    <a:bodyPr/>
-                    <a:lstStyle/>
-                    <a:p>
-                      <a:r>
-                        <a:t>1</a:t>
-                      </a:r>
-                    </a:p>
-                  </a:txBody>
-                  <a:tcPr/>
-                </a:tc>
-                <a:tc>
-                  <a:txBody>
-                    <a:bodyPr/>
-                    <a:lstStyle/>
-                    <a:p>
-                      <a:r>
-                        <a:t>16777</a:t>
-                      </a:r>
-                    </a:p>
-                  </a:txBody>
-                  <a:tcPr/>
-                </a:tc>
-                <a:tc>
-                  <a:txBody>
-                    <a:bodyPr/>
-                    <a:lstStyle/>
-                    <a:p>
-                      <a:r>
-                        <a:t>233.99</a:t>
-                      </a:r>
-                    </a:p>
-                  </a:txBody>
-                  <a:tcPr/>
-                </a:tc>
-                <a:tc>
-                  <a:txBody>
-                    <a:bodyPr/>
-                    <a:lstStyle/>
-                    <a:p>
-                      <a:r>
-                        <a:t>1.85</a:t>
-                      </a:r>
-                    </a:p>
-                  </a:txBody>
-                  <a:tcPr/>
-                </a:tc>
-                <a:tc>
-                  <a:txBody>
-                    <a:bodyPr/>
-                    <a:lstStyle/>
-                    <a:p>
-                      <a:r>
-                        <a:t>503.62</a:t>
-                      </a:r>
-                    </a:p>
-                  </a:txBody>
-                  <a:tcPr/>
-                </a:tc>
-                <a:tc>
-                  <a:txBody>
-                    <a:bodyPr/>
-                    <a:lstStyle/>
-                    <a:p>
-                      <a:r>
-                        <a:t>Regular</a:t>
-                      </a:r>
-                    </a:p>
-                  </a:txBody>
-                  <a:tcPr/>
-                </a:tc>
-              </a:tr>
-              <a:tr h="822960">
-                <a:tc>
-                  <a:txBody>
-                    <a:bodyPr/>
-                    <a:lstStyle/>
-                    <a:p>
-                      <a:r>
-                        <a:t>2</a:t>
-                      </a:r>
-                    </a:p>
-                  </a:txBody>
-                  <a:tcPr/>
-                </a:tc>
-                <a:tc>
-                  <a:txBody>
-                    <a:bodyPr/>
-                    <a:lstStyle/>
-                    <a:p>
-                      <a:r>
-                        <a:t>25383</a:t>
-                      </a:r>
-                    </a:p>
-                  </a:txBody>
-                  <a:tcPr/>
-                </a:tc>
-                <a:tc>
-                  <a:txBody>
-                    <a:bodyPr/>
-                    <a:lstStyle/>
-                    <a:p>
-                      <a:r>
-                        <a:t>62.5</a:t>
-                      </a:r>
-                    </a:p>
-                  </a:txBody>
-                  <a:tcPr/>
-                </a:tc>
-                <a:tc>
-                  <a:txBody>
-                    <a:bodyPr/>
-                    <a:lstStyle/>
-                    <a:p>
-                      <a:r>
-                        <a:t>4.87</a:t>
-                      </a:r>
-                    </a:p>
-                  </a:txBody>
-                  <a:tcPr/>
-                </a:tc>
-                <a:tc>
-                  <a:txBody>
-                    <a:bodyPr/>
-                    <a:lstStyle/>
-                    <a:p>
-                      <a:r>
-                        <a:t>1284.03</a:t>
-                      </a:r>
-                    </a:p>
-                  </a:txBody>
-                  <a:tcPr/>
-                </a:tc>
-                <a:tc>
-                  <a:txBody>
-                    <a:bodyPr/>
-                    <a:lstStyle/>
-                    <a:p>
-                      <a:r>
-                        <a:t>VIP</a:t>
-                      </a:r>
-                    </a:p>
-                  </a:txBody>
-                  <a:tcPr/>
-                </a:tc>
-              </a:tr>
-              <a:tr h="822960">
-                <a:tc>
-                  <a:txBody>
-                    <a:bodyPr/>
-                    <a:lstStyle/>
-                    <a:p>
-                      <a:r>
-                        <a:t>3</a:t>
-                      </a:r>
-                    </a:p>
-                  </a:txBody>
-                  <a:tcPr/>
-                </a:tc>
-                <a:tc>
-                  <a:txBody>
-                    <a:bodyPr/>
-                    <a:lstStyle/>
-                    <a:p>
-                      <a:r>
-                        <a:t>8418</a:t>
-                      </a:r>
-                    </a:p>
-                  </a:txBody>
-                  <a:tcPr/>
-                </a:tc>
-                <a:tc>
-                  <a:txBody>
-                    <a:bodyPr/>
-                    <a:lstStyle/>
-                    <a:p>
-                      <a:r>
-                        <a:t>155.67</a:t>
-                      </a:r>
-                    </a:p>
-                  </a:txBody>
-                  <a:tcPr/>
-                </a:tc>
-                <a:tc>
-                  <a:txBody>
-                    <a:bodyPr/>
-                    <a:lstStyle/>
-                    <a:p>
-                      <a:r>
-                        <a:t>1.22</a:t>
-                      </a:r>
-                    </a:p>
-                  </a:txBody>
-                  <a:tcPr/>
-                </a:tc>
-                <a:tc>
-                  <a:txBody>
-                    <a:bodyPr/>
-                    <a:lstStyle/>
-                    <a:p>
-                      <a:r>
-                        <a:t>127.87</a:t>
-                      </a:r>
-                    </a:p>
-                  </a:txBody>
-                  <a:tcPr/>
-                </a:tc>
-                <a:tc>
-                  <a:txBody>
-                    <a:bodyPr/>
-                    <a:lstStyle/>
-                    <a:p>
-                      <a:r>
-                        <a:t>Churn-risk</a:t>
-                      </a:r>
-                    </a:p>
-                  </a:txBody>
-                  <a:tcPr/>
-                </a:tc>
-              </a:tr>
-            </a:tbl>
-          </a:graphicData>
-        </a:graphic>
-      </p:graphicFrame>
+              <a:t>Insight &amp; Khuyến nghị (minh hoạ)</a:t>
+            </a:r>
+          </a:p>
+        </p:txBody>
+      </p:sp>
+      <p:sp>
+        <p:nvSpPr>
+          <p:cNvPr id="3" name="Content Placeholder 2"/>
+          <p:cNvSpPr>
+            <a:spLocks noGrp="1"/>
+          </p:cNvSpPr>
+          <p:nvPr>
+            <p:ph idx="1"/>
+          </p:nvPr>
+        </p:nvSpPr>
+        <p:spPr/>
+        <p:txBody>
+          <a:bodyPr/>
+          <a:lstStyle/>
+          <a:p>
+            <a:pPr/>
+            <a:r>
+              <a:t>Các cặp nhóm hàng có lift cao → đề xuất combo/cross‑sell trong checkout.</a:t>
+            </a:r>
+          </a:p>
+          <a:p>
+            <a:pPr/>
+            <a:r>
+              <a:t>Bố trí kệ: đặt gần nhau các nhóm thường đi chung.</a:t>
+            </a:r>
+          </a:p>
+          <a:p>
+            <a:pPr/>
+            <a:r>
+              <a:t>Thiết kế gói khuyến mại theo bộ 2–3 nhóm hàng.</a:t>
+            </a:r>
+          </a:p>
+        </p:txBody>
+      </p:sp>
     </p:spTree>
   </p:cSld>
   <p:clrMapOvr>
@@ -4866,10 +4741,6 @@
       </a:style>
     </a:lnDef>
   </a:objectDefaults>
-  <a:extLst>
-    <a:ext uri="{05A4C25C-085E-4340-85A3-A5531E510DB2}">
-      <thm15:themeFamily xmlns:thm15="http://schemas.microsoft.com/office/thememl/2012/main" name="Office Theme" id="{62F939B6-93AF-4DB8-9C6B-D6C7DFDC589F}" vid="{4A3C46E8-61CC-4603-A589-7422A47A8E4A}"/>
-    </a:ext>
-  </a:extLst>
+  <a:extraClrSchemeLst/>
 </a:theme>
 </file>
</xml_diff>